<commit_message>
Update 20260212-MIM - 2.0 in ontwikkeling.pptx
</commit_message>
<xml_diff>
--- a/werkomgeving/presentaties/20260212-MIM - 2.0 in ontwikkeling.pptx
+++ b/werkomgeving/presentaties/20260212-MIM - 2.0 in ontwikkeling.pptx
@@ -5,7 +5,7 @@
     <p:sldMasterId id="2147483648" r:id="rId4"/>
   </p:sldMasterIdLst>
   <p:notesMasterIdLst>
-    <p:notesMasterId r:id="rId25"/>
+    <p:notesMasterId r:id="rId17"/>
   </p:notesMasterIdLst>
   <p:sldIdLst>
     <p:sldId id="256" r:id="rId5"/>
@@ -16,18 +16,10 @@
     <p:sldId id="297" r:id="rId10"/>
     <p:sldId id="299" r:id="rId11"/>
     <p:sldId id="301" r:id="rId12"/>
-    <p:sldId id="302" r:id="rId13"/>
-    <p:sldId id="300" r:id="rId14"/>
-    <p:sldId id="270" r:id="rId15"/>
-    <p:sldId id="271" r:id="rId16"/>
-    <p:sldId id="292" r:id="rId17"/>
-    <p:sldId id="291" r:id="rId18"/>
-    <p:sldId id="290" r:id="rId19"/>
-    <p:sldId id="295" r:id="rId20"/>
-    <p:sldId id="294" r:id="rId21"/>
-    <p:sldId id="288" r:id="rId22"/>
-    <p:sldId id="287" r:id="rId23"/>
-    <p:sldId id="259" r:id="rId24"/>
+    <p:sldId id="303" r:id="rId13"/>
+    <p:sldId id="302" r:id="rId14"/>
+    <p:sldId id="304" r:id="rId15"/>
+    <p:sldId id="259" r:id="rId16"/>
   </p:sldIdLst>
   <p:sldSz cx="12192000" cy="6858000"/>
   <p:notesSz cx="6858000" cy="9144000"/>
@@ -739,7 +731,7 @@
           <a:p>
             <a:fld id="{F6BA0BEC-D659-49A0-BDC1-7AED8DDA2204}" type="datetimeFigureOut">
               <a:rPr lang="nl-NL" smtClean="0"/>
-              <a:t>28-1-2026</a:t>
+              <a:t>4-2-2026</a:t>
             </a:fld>
             <a:endParaRPr lang="nl-NL"/>
           </a:p>
@@ -1741,7 +1733,7 @@
             <a:fld id="{A2D4CE28-2779-4906-957D-A173F7999FCA}" type="datetime1">
               <a:rPr lang="nl-NL" smtClean="0"/>
               <a:pPr/>
-              <a:t>28-1-2026</a:t>
+              <a:t>4-2-2026</a:t>
             </a:fld>
             <a:endParaRPr lang="nl-NL" dirty="0"/>
           </a:p>
@@ -2037,7 +2029,7 @@
           <a:p>
             <a:fld id="{E0A2F211-4CA0-46C3-BAC9-237EE5A60786}" type="datetime1">
               <a:rPr lang="nl-NL" smtClean="0"/>
-              <a:t>28-1-2026</a:t>
+              <a:t>4-2-2026</a:t>
             </a:fld>
             <a:endParaRPr lang="nl-NL"/>
           </a:p>
@@ -2270,7 +2262,7 @@
           <a:p>
             <a:fld id="{E0A2F211-4CA0-46C3-BAC9-237EE5A60786}" type="datetime1">
               <a:rPr lang="nl-NL" smtClean="0"/>
-              <a:t>28-1-2026</a:t>
+              <a:t>4-2-2026</a:t>
             </a:fld>
             <a:endParaRPr lang="nl-NL"/>
           </a:p>
@@ -2562,7 +2554,7 @@
           <a:p>
             <a:fld id="{E0A2F211-4CA0-46C3-BAC9-237EE5A60786}" type="datetime1">
               <a:rPr lang="nl-NL" smtClean="0"/>
-              <a:t>28-1-2026</a:t>
+              <a:t>4-2-2026</a:t>
             </a:fld>
             <a:endParaRPr lang="nl-NL"/>
           </a:p>
@@ -2920,7 +2912,7 @@
           <a:p>
             <a:fld id="{E0A2F211-4CA0-46C3-BAC9-237EE5A60786}" type="datetime1">
               <a:rPr lang="nl-NL" smtClean="0"/>
-              <a:t>28-1-2026</a:t>
+              <a:t>4-2-2026</a:t>
             </a:fld>
             <a:endParaRPr lang="nl-NL"/>
           </a:p>
@@ -3244,7 +3236,7 @@
           <a:p>
             <a:fld id="{E0A2F211-4CA0-46C3-BAC9-237EE5A60786}" type="datetime1">
               <a:rPr lang="nl-NL" smtClean="0"/>
-              <a:t>28-1-2026</a:t>
+              <a:t>4-2-2026</a:t>
             </a:fld>
             <a:endParaRPr lang="nl-NL"/>
           </a:p>
@@ -3585,7 +3577,7 @@
           <a:p>
             <a:fld id="{E0A2F211-4CA0-46C3-BAC9-237EE5A60786}" type="datetime1">
               <a:rPr lang="nl-NL" smtClean="0"/>
-              <a:t>28-1-2026</a:t>
+              <a:t>4-2-2026</a:t>
             </a:fld>
             <a:endParaRPr lang="nl-NL"/>
           </a:p>
@@ -3962,7 +3954,7 @@
           <a:p>
             <a:fld id="{E0A2F211-4CA0-46C3-BAC9-237EE5A60786}" type="datetime1">
               <a:rPr lang="nl-NL" smtClean="0"/>
-              <a:t>28-1-2026</a:t>
+              <a:t>4-2-2026</a:t>
             </a:fld>
             <a:endParaRPr lang="nl-NL"/>
           </a:p>
@@ -4295,7 +4287,7 @@
           <a:p>
             <a:fld id="{E0A2F211-4CA0-46C3-BAC9-237EE5A60786}" type="datetime1">
               <a:rPr lang="nl-NL" smtClean="0"/>
-              <a:t>28-1-2026</a:t>
+              <a:t>4-2-2026</a:t>
             </a:fld>
             <a:endParaRPr lang="nl-NL"/>
           </a:p>
@@ -4628,7 +4620,7 @@
           <a:p>
             <a:fld id="{E0A2F211-4CA0-46C3-BAC9-237EE5A60786}" type="datetime1">
               <a:rPr lang="nl-NL" smtClean="0"/>
-              <a:t>28-1-2026</a:t>
+              <a:t>4-2-2026</a:t>
             </a:fld>
             <a:endParaRPr lang="nl-NL"/>
           </a:p>
@@ -4779,7 +4771,7 @@
           <a:p>
             <a:fld id="{A505C2FD-3A9E-4FB6-9665-708E4478422C}" type="datetime1">
               <a:rPr lang="nl-NL" smtClean="0"/>
-              <a:t>28-1-2026</a:t>
+              <a:t>4-2-2026</a:t>
             </a:fld>
             <a:endParaRPr lang="nl-NL"/>
           </a:p>
@@ -5699,7 +5691,7 @@
           <a:p>
             <a:fld id="{472D8C46-45ED-4977-8DF5-FEAAF18B775F}" type="datetime1">
               <a:rPr lang="nl-NL" smtClean="0"/>
-              <a:t>28-1-2026</a:t>
+              <a:t>4-2-2026</a:t>
             </a:fld>
             <a:endParaRPr lang="nl-NL"/>
           </a:p>
@@ -5840,7 +5832,7 @@
           <a:p>
             <a:fld id="{472D8C46-45ED-4977-8DF5-FEAAF18B775F}" type="datetime1">
               <a:rPr lang="nl-NL" smtClean="0"/>
-              <a:t>28-1-2026</a:t>
+              <a:t>4-2-2026</a:t>
             </a:fld>
             <a:endParaRPr lang="nl-NL"/>
           </a:p>
@@ -6381,7 +6373,7 @@
           <a:p>
             <a:fld id="{472D8C46-45ED-4977-8DF5-FEAAF18B775F}" type="datetime1">
               <a:rPr lang="nl-NL" smtClean="0"/>
-              <a:t>28-1-2026</a:t>
+              <a:t>4-2-2026</a:t>
             </a:fld>
             <a:endParaRPr lang="nl-NL"/>
           </a:p>
@@ -7322,7 +7314,7 @@
           <a:p>
             <a:fld id="{472D8C46-45ED-4977-8DF5-FEAAF18B775F}" type="datetime1">
               <a:rPr lang="nl-NL" smtClean="0"/>
-              <a:t>28-1-2026</a:t>
+              <a:t>4-2-2026</a:t>
             </a:fld>
             <a:endParaRPr lang="nl-NL"/>
           </a:p>
@@ -10909,7 +10901,7 @@
           <a:p>
             <a:fld id="{97D724BB-B06D-456B-989F-E4E6B54E3121}" type="datetime1">
               <a:rPr lang="nl-NL" smtClean="0"/>
-              <a:t>28-1-2026</a:t>
+              <a:t>4-2-2026</a:t>
             </a:fld>
             <a:endParaRPr lang="nl-NL"/>
           </a:p>
@@ -11022,7 +11014,7 @@
           <a:p>
             <a:fld id="{406088AE-63DC-4099-90B6-C0DEFB5E6602}" type="datetime1">
               <a:rPr lang="nl-NL" smtClean="0"/>
-              <a:t>28-1-2026</a:t>
+              <a:t>4-2-2026</a:t>
             </a:fld>
             <a:endParaRPr lang="nl-NL"/>
           </a:p>
@@ -11168,7 +11160,7 @@
           <a:p>
             <a:fld id="{97D724BB-B06D-456B-989F-E4E6B54E3121}" type="datetime1">
               <a:rPr lang="nl-NL" smtClean="0"/>
-              <a:t>28-1-2026</a:t>
+              <a:t>4-2-2026</a:t>
             </a:fld>
             <a:endParaRPr lang="nl-NL"/>
           </a:p>
@@ -11444,7 +11436,7 @@
           <a:p>
             <a:fld id="{472D8C46-45ED-4977-8DF5-FEAAF18B775F}" type="datetime1">
               <a:rPr lang="nl-NL" smtClean="0"/>
-              <a:t>28-1-2026</a:t>
+              <a:t>4-2-2026</a:t>
             </a:fld>
             <a:endParaRPr lang="nl-NL"/>
           </a:p>
@@ -15414,7 +15406,7 @@
             <a:fld id="{A2D4CE28-2779-4906-957D-A173F7999FCA}" type="datetime1">
               <a:rPr lang="nl-NL" smtClean="0"/>
               <a:pPr/>
-              <a:t>28-1-2026</a:t>
+              <a:t>4-2-2026</a:t>
             </a:fld>
             <a:endParaRPr lang="nl-NL" dirty="0"/>
           </a:p>
@@ -16207,7 +16199,7 @@
             <a:fld id="{002A0C75-8C73-4BC2-A110-8B70C26DE224}" type="datetime1">
               <a:rPr lang="nl-NL" smtClean="0"/>
               <a:pPr/>
-              <a:t>28-1-2026</a:t>
+              <a:t>4-2-2026</a:t>
             </a:fld>
             <a:endParaRPr lang="nl-NL" dirty="0"/>
           </a:p>
@@ -17028,7 +17020,7 @@
             <a:fld id="{A2D4CE28-2779-4906-957D-A173F7999FCA}" type="datetime1">
               <a:rPr lang="nl-NL" smtClean="0"/>
               <a:pPr/>
-              <a:t>28-1-2026</a:t>
+              <a:t>4-2-2026</a:t>
             </a:fld>
             <a:endParaRPr lang="nl-NL" dirty="0"/>
           </a:p>
@@ -17312,7 +17304,7 @@
           <a:p>
             <a:fld id="{B234C477-5CCC-4E58-9207-9007DC239AB4}" type="datetime1">
               <a:rPr lang="nl-NL" smtClean="0"/>
-              <a:t>28-1-2026</a:t>
+              <a:t>4-2-2026</a:t>
             </a:fld>
             <a:endParaRPr lang="nl-NL" dirty="0"/>
           </a:p>
@@ -17613,7 +17605,7 @@
           <a:p>
             <a:fld id="{B234C477-5CCC-4E58-9207-9007DC239AB4}" type="datetime1">
               <a:rPr lang="nl-NL" smtClean="0"/>
-              <a:t>28-1-2026</a:t>
+              <a:t>4-2-2026</a:t>
             </a:fld>
             <a:endParaRPr lang="nl-NL" dirty="0"/>
           </a:p>
@@ -17914,7 +17906,7 @@
           <a:p>
             <a:fld id="{B234C477-5CCC-4E58-9207-9007DC239AB4}" type="datetime1">
               <a:rPr lang="nl-NL" smtClean="0"/>
-              <a:t>28-1-2026</a:t>
+              <a:t>4-2-2026</a:t>
             </a:fld>
             <a:endParaRPr lang="nl-NL" dirty="0"/>
           </a:p>
@@ -18210,7 +18202,7 @@
             <a:fld id="{002A0C75-8C73-4BC2-A110-8B70C26DE224}" type="datetime1">
               <a:rPr lang="nl-NL" smtClean="0"/>
               <a:pPr/>
-              <a:t>28-1-2026</a:t>
+              <a:t>4-2-2026</a:t>
             </a:fld>
             <a:endParaRPr lang="nl-NL" dirty="0"/>
           </a:p>
@@ -19139,7 +19131,7 @@
             <a:fld id="{875EA9B3-809F-44BB-B7CF-79FF1B0E462C}" type="datetime2">
               <a:rPr lang="nl-NL" smtClean="0"/>
               <a:pPr/>
-              <a:t>woensdag 28 januari 2026</a:t>
+              <a:t>woensdag 4 februari 2026</a:t>
             </a:fld>
             <a:endParaRPr lang="nl-NL" dirty="0"/>
           </a:p>
@@ -19210,7 +19202,7 @@
           <p:cNvPr id="2" name="Titel 1">
             <a:extLst>
               <a:ext uri="{FF2B5EF4-FFF2-40B4-BE49-F238E27FC236}">
-                <a16:creationId xmlns:a16="http://schemas.microsoft.com/office/drawing/2014/main" id="{5F213C12-FE5A-D049-CCFF-8EC6EBBA897D}"/>
+                <a16:creationId xmlns:a16="http://schemas.microsoft.com/office/drawing/2014/main" id="{22DC561B-9BC8-2608-6CCA-CBFB54894B04}"/>
               </a:ext>
             </a:extLst>
           </p:cNvPr>
@@ -19221,37 +19213,22 @@
             <p:ph type="title"/>
           </p:nvPr>
         </p:nvSpPr>
-        <p:spPr/>
-        <p:txBody>
-          <a:bodyPr/>
+        <p:spPr>
+          <a:xfrm>
+            <a:off x="280989" y="457201"/>
+            <a:ext cx="3795711" cy="1280159"/>
+          </a:xfrm>
+        </p:spPr>
+        <p:txBody>
+          <a:bodyPr>
+            <a:normAutofit fontScale="90000"/>
+          </a:bodyPr>
           <a:lstStyle/>
           <a:p>
-            <a:endParaRPr lang="nl-NL"/>
-          </a:p>
-        </p:txBody>
-      </p:sp>
-      <p:sp>
-        <p:nvSpPr>
-          <p:cNvPr id="3" name="Tijdelijke aanduiding voor inhoud 2">
-            <a:extLst>
-              <a:ext uri="{FF2B5EF4-FFF2-40B4-BE49-F238E27FC236}">
-                <a16:creationId xmlns:a16="http://schemas.microsoft.com/office/drawing/2014/main" id="{C0827C99-2B63-6AF9-309A-2745DB44B552}"/>
-              </a:ext>
-            </a:extLst>
-          </p:cNvPr>
-          <p:cNvSpPr>
-            <a:spLocks noGrp="1"/>
-          </p:cNvSpPr>
-          <p:nvPr>
-            <p:ph idx="1"/>
-          </p:nvPr>
-        </p:nvSpPr>
-        <p:spPr/>
-        <p:txBody>
-          <a:bodyPr/>
-          <a:lstStyle/>
-          <a:p>
-            <a:endParaRPr lang="nl-NL"/>
+            <a:r>
+              <a:rPr lang="nl-NL" dirty="0"/>
+              <a:t>Schets metamodel MIM-CIM</a:t>
+            </a:r>
           </a:p>
         </p:txBody>
       </p:sp>
@@ -19260,7 +19237,7 @@
           <p:cNvPr id="4" name="Tijdelijke aanduiding voor dianummer 3">
             <a:extLst>
               <a:ext uri="{FF2B5EF4-FFF2-40B4-BE49-F238E27FC236}">
-                <a16:creationId xmlns:a16="http://schemas.microsoft.com/office/drawing/2014/main" id="{DC44128E-BB9D-32BA-D089-5570040FB9F0}"/>
+                <a16:creationId xmlns:a16="http://schemas.microsoft.com/office/drawing/2014/main" id="{F9E38CE4-2F62-8908-E3CF-E03585EE9F5D}"/>
               </a:ext>
             </a:extLst>
           </p:cNvPr>
@@ -19286,20 +19263,20 @@
       </p:sp>
       <p:sp>
         <p:nvSpPr>
-          <p:cNvPr id="6" name="Tekstvak 5">
-            <a:extLst>
-              <a:ext uri="{FF2B5EF4-FFF2-40B4-BE49-F238E27FC236}">
-                <a16:creationId xmlns:a16="http://schemas.microsoft.com/office/drawing/2014/main" id="{4F8437E3-8C7F-36AC-1446-E345A6C60E4D}"/>
-              </a:ext>
-            </a:extLst>
-          </p:cNvPr>
-          <p:cNvSpPr txBox="1"/>
+          <p:cNvPr id="9" name="Rechthoek 8">
+            <a:extLst>
+              <a:ext uri="{FF2B5EF4-FFF2-40B4-BE49-F238E27FC236}">
+                <a16:creationId xmlns:a16="http://schemas.microsoft.com/office/drawing/2014/main" id="{103A08E9-05D6-90A6-84EC-EE5DC4076447}"/>
+              </a:ext>
+            </a:extLst>
+          </p:cNvPr>
+          <p:cNvSpPr/>
           <p:nvPr/>
         </p:nvSpPr>
         <p:spPr>
           <a:xfrm>
-            <a:off x="3048000" y="3252216"/>
-            <a:ext cx="6096000" cy="369332"/>
+            <a:off x="-55654" y="2551837"/>
+            <a:ext cx="4132354" cy="1754326"/>
           </a:xfrm>
           <a:prstGeom prst="rect">
             <a:avLst/>
@@ -19307,22 +19284,80 @@
           <a:noFill/>
         </p:spPr>
         <p:txBody>
-          <a:bodyPr wrap="square">
+          <a:bodyPr wrap="square" lIns="91440" tIns="45720" rIns="91440" bIns="45720">
             <a:spAutoFit/>
           </a:bodyPr>
           <a:lstStyle/>
           <a:p>
-            <a:r>
-              <a:rPr lang="nl-NL" sz="1800" dirty="0"/>
-              <a:t>Planning</a:t>
-            </a:r>
-          </a:p>
-        </p:txBody>
-      </p:sp>
+            <a:pPr algn="ctr"/>
+            <a:r>
+              <a:rPr lang="nl-NL" sz="5400" b="1" cap="none" spc="0" dirty="0">
+                <a:ln w="12700">
+                  <a:solidFill>
+                    <a:schemeClr val="tx2">
+                      <a:lumMod val="75000"/>
+                    </a:schemeClr>
+                  </a:solidFill>
+                  <a:prstDash val="solid"/>
+                </a:ln>
+                <a:pattFill prst="dkUpDiag">
+                  <a:fgClr>
+                    <a:schemeClr val="tx2"/>
+                  </a:fgClr>
+                  <a:bgClr>
+                    <a:schemeClr val="tx2">
+                      <a:lumMod val="20000"/>
+                      <a:lumOff val="80000"/>
+                    </a:schemeClr>
+                  </a:bgClr>
+                </a:pattFill>
+                <a:effectLst>
+                  <a:outerShdw dist="38100" dir="2640000" algn="bl" rotWithShape="0">
+                    <a:schemeClr val="tx2">
+                      <a:lumMod val="75000"/>
+                    </a:schemeClr>
+                  </a:outerShdw>
+                </a:effectLst>
+              </a:rPr>
+              <a:t>Werk in uitvoering</a:t>
+            </a:r>
+          </a:p>
+        </p:txBody>
+      </p:sp>
+      <p:pic>
+        <p:nvPicPr>
+          <p:cNvPr id="11" name="Afbeelding 10" descr="Afbeelding met tekst, diagram, Plan, Parallel&#10;&#10;Door AI gegenereerde inhoud is mogelijk onjuist.">
+            <a:extLst>
+              <a:ext uri="{FF2B5EF4-FFF2-40B4-BE49-F238E27FC236}">
+                <a16:creationId xmlns:a16="http://schemas.microsoft.com/office/drawing/2014/main" id="{2654290F-6AE0-8C6C-B9F4-5953251422F8}"/>
+              </a:ext>
+            </a:extLst>
+          </p:cNvPr>
+          <p:cNvPicPr>
+            <a:picLocks noChangeAspect="1"/>
+          </p:cNvPicPr>
+          <p:nvPr/>
+        </p:nvPicPr>
+        <p:blipFill>
+          <a:blip r:embed="rId2"/>
+          <a:stretch>
+            <a:fillRect/>
+          </a:stretch>
+        </p:blipFill>
+        <p:spPr>
+          <a:xfrm>
+            <a:off x="4621640" y="36045"/>
+            <a:ext cx="7501669" cy="6858000"/>
+          </a:xfrm>
+          <a:prstGeom prst="rect">
+            <a:avLst/>
+          </a:prstGeom>
+        </p:spPr>
+      </p:pic>
     </p:spTree>
     <p:extLst>
       <p:ext uri="{BB962C8B-B14F-4D97-AF65-F5344CB8AC3E}">
-        <p14:creationId xmlns:p14="http://schemas.microsoft.com/office/powerpoint/2010/main" val="2260746213"/>
+        <p14:creationId xmlns:p14="http://schemas.microsoft.com/office/powerpoint/2010/main" val="662030528"/>
       </p:ext>
     </p:extLst>
   </p:cSld>
@@ -19349,12 +19384,139 @@
           <a:chExt cx="0" cy="0"/>
         </a:xfrm>
       </p:grpSpPr>
+      <p:sp>
+        <p:nvSpPr>
+          <p:cNvPr id="4" name="Tijdelijke aanduiding voor dianummer 3">
+            <a:extLst>
+              <a:ext uri="{FF2B5EF4-FFF2-40B4-BE49-F238E27FC236}">
+                <a16:creationId xmlns:a16="http://schemas.microsoft.com/office/drawing/2014/main" id="{F2EF137F-D8D0-DBC2-A1FD-575568E4E537}"/>
+              </a:ext>
+            </a:extLst>
+          </p:cNvPr>
+          <p:cNvSpPr>
+            <a:spLocks noGrp="1"/>
+          </p:cNvSpPr>
+          <p:nvPr>
+            <p:ph type="sldNum" sz="quarter" idx="12"/>
+          </p:nvPr>
+        </p:nvSpPr>
+        <p:spPr/>
+        <p:txBody>
+          <a:bodyPr/>
+          <a:lstStyle/>
+          <a:p>
+            <a:fld id="{A648B885-FF76-47CB-8BBD-27E7EBF07CA9}" type="slidenum">
+              <a:rPr lang="nl-NL" smtClean="0"/>
+              <a:t>11</a:t>
+            </a:fld>
+            <a:endParaRPr lang="nl-NL"/>
+          </a:p>
+        </p:txBody>
+      </p:sp>
+      <p:sp>
+        <p:nvSpPr>
+          <p:cNvPr id="5" name="Titel 1">
+            <a:extLst>
+              <a:ext uri="{FF2B5EF4-FFF2-40B4-BE49-F238E27FC236}">
+                <a16:creationId xmlns:a16="http://schemas.microsoft.com/office/drawing/2014/main" id="{CDB7DD62-0016-DEE1-8A1C-35CEAB126CF3}"/>
+              </a:ext>
+            </a:extLst>
+          </p:cNvPr>
+          <p:cNvSpPr>
+            <a:spLocks noGrp="1"/>
+          </p:cNvSpPr>
+          <p:nvPr>
+            <p:ph type="title"/>
+          </p:nvPr>
+        </p:nvSpPr>
+        <p:spPr>
+          <a:xfrm>
+            <a:off x="280989" y="457201"/>
+            <a:ext cx="3795711" cy="1280159"/>
+          </a:xfrm>
+        </p:spPr>
+        <p:txBody>
+          <a:bodyPr>
+            <a:normAutofit fontScale="90000"/>
+          </a:bodyPr>
+          <a:lstStyle/>
+          <a:p>
+            <a:r>
+              <a:rPr lang="nl-NL" dirty="0"/>
+              <a:t>Schets metamodel MIM-LGM</a:t>
+            </a:r>
+          </a:p>
+        </p:txBody>
+      </p:sp>
+      <p:sp>
+        <p:nvSpPr>
+          <p:cNvPr id="6" name="Rechthoek 5">
+            <a:extLst>
+              <a:ext uri="{FF2B5EF4-FFF2-40B4-BE49-F238E27FC236}">
+                <a16:creationId xmlns:a16="http://schemas.microsoft.com/office/drawing/2014/main" id="{A1325EB4-D31D-2BA1-D1BF-54C007044776}"/>
+              </a:ext>
+            </a:extLst>
+          </p:cNvPr>
+          <p:cNvSpPr/>
+          <p:nvPr/>
+        </p:nvSpPr>
+        <p:spPr>
+          <a:xfrm>
+            <a:off x="112667" y="2672607"/>
+            <a:ext cx="4132354" cy="1754326"/>
+          </a:xfrm>
+          <a:prstGeom prst="rect">
+            <a:avLst/>
+          </a:prstGeom>
+          <a:noFill/>
+        </p:spPr>
+        <p:txBody>
+          <a:bodyPr wrap="square" lIns="91440" tIns="45720" rIns="91440" bIns="45720">
+            <a:spAutoFit/>
+          </a:bodyPr>
+          <a:lstStyle/>
+          <a:p>
+            <a:pPr algn="ctr"/>
+            <a:r>
+              <a:rPr lang="nl-NL" sz="5400" b="1" cap="none" spc="0" dirty="0">
+                <a:ln w="12700">
+                  <a:solidFill>
+                    <a:schemeClr val="tx2">
+                      <a:lumMod val="75000"/>
+                    </a:schemeClr>
+                  </a:solidFill>
+                  <a:prstDash val="solid"/>
+                </a:ln>
+                <a:pattFill prst="dkUpDiag">
+                  <a:fgClr>
+                    <a:schemeClr val="tx2"/>
+                  </a:fgClr>
+                  <a:bgClr>
+                    <a:schemeClr val="tx2">
+                      <a:lumMod val="20000"/>
+                      <a:lumOff val="80000"/>
+                    </a:schemeClr>
+                  </a:bgClr>
+                </a:pattFill>
+                <a:effectLst>
+                  <a:outerShdw dist="38100" dir="2640000" algn="bl" rotWithShape="0">
+                    <a:schemeClr val="tx2">
+                      <a:lumMod val="75000"/>
+                    </a:schemeClr>
+                  </a:outerShdw>
+                </a:effectLst>
+              </a:rPr>
+              <a:t>Werk in uitvoering</a:t>
+            </a:r>
+          </a:p>
+        </p:txBody>
+      </p:sp>
       <p:pic>
         <p:nvPicPr>
-          <p:cNvPr id="5" name="Afbeelding 4">
-            <a:extLst>
-              <a:ext uri="{FF2B5EF4-FFF2-40B4-BE49-F238E27FC236}">
-                <a16:creationId xmlns:a16="http://schemas.microsoft.com/office/drawing/2014/main" id="{699942B2-77B6-4769-BC1C-F15B52D36077}"/>
+          <p:cNvPr id="12" name="Afbeelding 11" descr="Afbeelding met tekst, diagram, Plan, Parallel&#10;&#10;Door AI gegenereerde inhoud is mogelijk onjuist.">
+            <a:extLst>
+              <a:ext uri="{FF2B5EF4-FFF2-40B4-BE49-F238E27FC236}">
+                <a16:creationId xmlns:a16="http://schemas.microsoft.com/office/drawing/2014/main" id="{DD6B21CC-2E9F-E073-F203-74FE98E23B89}"/>
               </a:ext>
             </a:extLst>
           </p:cNvPr>
@@ -19364,137 +19526,25 @@
           <p:nvPr/>
         </p:nvPicPr>
         <p:blipFill>
-          <a:blip r:embed="rId2">
-            <a:extLst>
-              <a:ext uri="{28A0092B-C50C-407E-A947-70E740481C1C}">
-                <a14:useLocalDpi xmlns:a14="http://schemas.microsoft.com/office/drawing/2010/main" val="0"/>
-              </a:ext>
-            </a:extLst>
-          </a:blip>
+          <a:blip r:embed="rId2"/>
           <a:stretch>
             <a:fillRect/>
           </a:stretch>
         </p:blipFill>
         <p:spPr>
           <a:xfrm>
-            <a:off x="140689" y="0"/>
-            <a:ext cx="12191999" cy="6858000"/>
+            <a:off x="6282637" y="36045"/>
+            <a:ext cx="5796696" cy="6858000"/>
           </a:xfrm>
           <a:prstGeom prst="rect">
             <a:avLst/>
           </a:prstGeom>
         </p:spPr>
       </p:pic>
-      <p:sp>
-        <p:nvSpPr>
-          <p:cNvPr id="2" name="Rechthoek 1">
-            <a:extLst>
-              <a:ext uri="{FF2B5EF4-FFF2-40B4-BE49-F238E27FC236}">
-                <a16:creationId xmlns:a16="http://schemas.microsoft.com/office/drawing/2014/main" id="{F0F9EB60-2977-3832-53C1-0CCA552055EA}"/>
-              </a:ext>
-            </a:extLst>
-          </p:cNvPr>
-          <p:cNvSpPr/>
-          <p:nvPr/>
-        </p:nvSpPr>
-        <p:spPr>
-          <a:xfrm rot="19375929">
-            <a:off x="4875185" y="2592764"/>
-            <a:ext cx="2441630" cy="923330"/>
-          </a:xfrm>
-          <a:prstGeom prst="rect">
-            <a:avLst/>
-          </a:prstGeom>
-          <a:noFill/>
-        </p:spPr>
-        <p:txBody>
-          <a:bodyPr wrap="none" lIns="91440" tIns="45720" rIns="91440" bIns="45720">
-            <a:spAutoFit/>
-          </a:bodyPr>
-          <a:lstStyle/>
-          <a:p>
-            <a:pPr algn="ctr"/>
-            <a:r>
-              <a:rPr lang="nl-NL" sz="5400" b="1" cap="none" spc="0" dirty="0">
-                <a:ln w="12700">
-                  <a:solidFill>
-                    <a:schemeClr val="accent3">
-                      <a:lumMod val="50000"/>
-                    </a:schemeClr>
-                  </a:solidFill>
-                  <a:prstDash val="solid"/>
-                </a:ln>
-                <a:solidFill>
-                  <a:srgbClr val="FF0000"/>
-                </a:solidFill>
-                <a:effectLst>
-                  <a:innerShdw blurRad="177800">
-                    <a:srgbClr val="FF0000"/>
-                  </a:innerShdw>
-                </a:effectLst>
-              </a:rPr>
-              <a:t>NL-SBB</a:t>
-            </a:r>
-          </a:p>
-        </p:txBody>
-      </p:sp>
-      <p:sp>
-        <p:nvSpPr>
-          <p:cNvPr id="4" name="Rechthoek 3">
-            <a:extLst>
-              <a:ext uri="{FF2B5EF4-FFF2-40B4-BE49-F238E27FC236}">
-                <a16:creationId xmlns:a16="http://schemas.microsoft.com/office/drawing/2014/main" id="{FA12187E-9895-BAC4-BFE2-F2A01BB5A320}"/>
-              </a:ext>
-            </a:extLst>
-          </p:cNvPr>
-          <p:cNvSpPr/>
-          <p:nvPr/>
-        </p:nvSpPr>
-        <p:spPr>
-          <a:xfrm rot="19398441">
-            <a:off x="4799874" y="4822531"/>
-            <a:ext cx="2239716" cy="1323439"/>
-          </a:xfrm>
-          <a:prstGeom prst="rect">
-            <a:avLst/>
-          </a:prstGeom>
-          <a:noFill/>
-        </p:spPr>
-        <p:txBody>
-          <a:bodyPr wrap="none" lIns="91440" tIns="45720" rIns="91440" bIns="45720">
-            <a:spAutoFit/>
-          </a:bodyPr>
-          <a:lstStyle/>
-          <a:p>
-            <a:pPr algn="ctr"/>
-            <a:r>
-              <a:rPr lang="nl-NL" sz="8000" b="1" cap="none" spc="0" dirty="0">
-                <a:ln w="12700">
-                  <a:solidFill>
-                    <a:schemeClr val="accent3">
-                      <a:lumMod val="50000"/>
-                    </a:schemeClr>
-                  </a:solidFill>
-                  <a:prstDash val="solid"/>
-                </a:ln>
-                <a:solidFill>
-                  <a:srgbClr val="FF0000"/>
-                </a:solidFill>
-                <a:effectLst>
-                  <a:innerShdw blurRad="177800">
-                    <a:srgbClr val="FF0000"/>
-                  </a:innerShdw>
-                </a:effectLst>
-              </a:rPr>
-              <a:t>MIM</a:t>
-            </a:r>
-          </a:p>
-        </p:txBody>
-      </p:sp>
     </p:spTree>
     <p:extLst>
       <p:ext uri="{BB962C8B-B14F-4D97-AF65-F5344CB8AC3E}">
-        <p14:creationId xmlns:p14="http://schemas.microsoft.com/office/powerpoint/2010/main" val="3723484845"/>
+        <p14:creationId xmlns:p14="http://schemas.microsoft.com/office/powerpoint/2010/main" val="2135245049"/>
       </p:ext>
     </p:extLst>
   </p:cSld>
@@ -19521,91 +19571,30 @@
           <a:chExt cx="0" cy="0"/>
         </a:xfrm>
       </p:grpSpPr>
-      <p:pic>
-        <p:nvPicPr>
-          <p:cNvPr id="3" name="Afbeelding 2">
-            <a:extLst>
-              <a:ext uri="{FF2B5EF4-FFF2-40B4-BE49-F238E27FC236}">
-                <a16:creationId xmlns:a16="http://schemas.microsoft.com/office/drawing/2014/main" id="{18698EAA-0152-4F0C-9DC1-37A9AB878090}"/>
-              </a:ext>
-            </a:extLst>
-          </p:cNvPr>
-          <p:cNvPicPr>
-            <a:picLocks noChangeAspect="1"/>
-          </p:cNvPicPr>
-          <p:nvPr/>
-        </p:nvPicPr>
-        <p:blipFill>
-          <a:blip r:embed="rId2">
-            <a:extLst>
-              <a:ext uri="{28A0092B-C50C-407E-A947-70E740481C1C}">
-                <a14:useLocalDpi xmlns:a14="http://schemas.microsoft.com/office/drawing/2010/main" val="0"/>
-              </a:ext>
-            </a:extLst>
-          </a:blip>
-          <a:stretch>
-            <a:fillRect/>
-          </a:stretch>
-        </p:blipFill>
-        <p:spPr>
-          <a:xfrm>
-            <a:off x="0" y="0"/>
-            <a:ext cx="12191999" cy="6858000"/>
-          </a:xfrm>
-          <a:prstGeom prst="rect">
-            <a:avLst/>
-          </a:prstGeom>
-        </p:spPr>
-      </p:pic>
-      <p:sp>
-        <p:nvSpPr>
-          <p:cNvPr id="2" name="Rechthoek 1">
-            <a:extLst>
-              <a:ext uri="{FF2B5EF4-FFF2-40B4-BE49-F238E27FC236}">
-                <a16:creationId xmlns:a16="http://schemas.microsoft.com/office/drawing/2014/main" id="{B51743C2-59A3-BFA7-DC49-B4B05D6427AF}"/>
-              </a:ext>
-            </a:extLst>
-          </p:cNvPr>
-          <p:cNvSpPr/>
-          <p:nvPr/>
-        </p:nvSpPr>
-        <p:spPr>
-          <a:xfrm rot="20016071">
-            <a:off x="4843941" y="1819832"/>
-            <a:ext cx="2239716" cy="1323439"/>
-          </a:xfrm>
-          <a:prstGeom prst="rect">
-            <a:avLst/>
-          </a:prstGeom>
-          <a:noFill/>
-        </p:spPr>
-        <p:txBody>
-          <a:bodyPr wrap="none" lIns="91440" tIns="45720" rIns="91440" bIns="45720">
-            <a:spAutoFit/>
-          </a:bodyPr>
+      <p:sp>
+        <p:nvSpPr>
+          <p:cNvPr id="4" name="Titel 3">
+            <a:extLst>
+              <a:ext uri="{FF2B5EF4-FFF2-40B4-BE49-F238E27FC236}">
+                <a16:creationId xmlns:a16="http://schemas.microsoft.com/office/drawing/2014/main" id="{CACBE8CC-58DC-1303-F27C-EB90E74D6549}"/>
+              </a:ext>
+            </a:extLst>
+          </p:cNvPr>
+          <p:cNvSpPr>
+            <a:spLocks noGrp="1"/>
+          </p:cNvSpPr>
+          <p:nvPr>
+            <p:ph type="title"/>
+          </p:nvPr>
+        </p:nvSpPr>
+        <p:spPr/>
+        <p:txBody>
+          <a:bodyPr/>
           <a:lstStyle/>
           <a:p>
-            <a:pPr algn="ctr"/>
-            <a:r>
-              <a:rPr lang="nl-NL" sz="8000" b="1" cap="none" spc="0" dirty="0">
-                <a:ln w="12700">
-                  <a:solidFill>
-                    <a:schemeClr val="accent3">
-                      <a:lumMod val="50000"/>
-                    </a:schemeClr>
-                  </a:solidFill>
-                  <a:prstDash val="solid"/>
-                </a:ln>
-                <a:solidFill>
-                  <a:srgbClr val="FF0000"/>
-                </a:solidFill>
-                <a:effectLst>
-                  <a:innerShdw blurRad="177800">
-                    <a:srgbClr val="FF0000"/>
-                  </a:innerShdw>
-                </a:effectLst>
-              </a:rPr>
-              <a:t>MIM</a:t>
+            <a:r>
+              <a:rPr lang="nl-NL" dirty="0"/>
+              <a:t>Bedankt!</a:t>
             </a:r>
           </a:p>
         </p:txBody>
@@ -19613,1875 +19602,7 @@
     </p:spTree>
     <p:extLst>
       <p:ext uri="{BB962C8B-B14F-4D97-AF65-F5344CB8AC3E}">
-        <p14:creationId xmlns:p14="http://schemas.microsoft.com/office/powerpoint/2010/main" val="2270571712"/>
-      </p:ext>
-    </p:extLst>
-  </p:cSld>
-  <p:clrMapOvr>
-    <a:masterClrMapping/>
-  </p:clrMapOvr>
-</p:sld>
-</file>
-
-<file path=ppt/slides/slide13.xml><?xml version="1.0" encoding="utf-8"?>
-<p:sld xmlns:a="http://schemas.openxmlformats.org/drawingml/2006/main" xmlns:r="http://schemas.openxmlformats.org/officeDocument/2006/relationships" xmlns:p="http://schemas.openxmlformats.org/presentationml/2006/main">
-  <p:cSld>
-    <p:spTree>
-      <p:nvGrpSpPr>
-        <p:cNvPr id="1" name=""/>
-        <p:cNvGrpSpPr/>
-        <p:nvPr/>
-      </p:nvGrpSpPr>
-      <p:grpSpPr>
-        <a:xfrm>
-          <a:off x="0" y="0"/>
-          <a:ext cx="0" cy="0"/>
-          <a:chOff x="0" y="0"/>
-          <a:chExt cx="0" cy="0"/>
-        </a:xfrm>
-      </p:grpSpPr>
-      <p:sp>
-        <p:nvSpPr>
-          <p:cNvPr id="2" name="Titel 1">
-            <a:extLst>
-              <a:ext uri="{FF2B5EF4-FFF2-40B4-BE49-F238E27FC236}">
-                <a16:creationId xmlns:a16="http://schemas.microsoft.com/office/drawing/2014/main" id="{FAE7CB96-A986-7786-6FD1-4E44D93C2CFE}"/>
-              </a:ext>
-            </a:extLst>
-          </p:cNvPr>
-          <p:cNvSpPr>
-            <a:spLocks noGrp="1"/>
-          </p:cNvSpPr>
-          <p:nvPr>
-            <p:ph type="title"/>
-          </p:nvPr>
-        </p:nvSpPr>
-        <p:spPr/>
-        <p:txBody>
-          <a:bodyPr/>
-          <a:lstStyle/>
-          <a:p>
-            <a:r>
-              <a:rPr lang="nl-NL" dirty="0"/>
-              <a:t>MIM</a:t>
-            </a:r>
-          </a:p>
-        </p:txBody>
-      </p:sp>
-      <p:sp>
-        <p:nvSpPr>
-          <p:cNvPr id="3" name="Tijdelijke aanduiding voor inhoud 2">
-            <a:extLst>
-              <a:ext uri="{FF2B5EF4-FFF2-40B4-BE49-F238E27FC236}">
-                <a16:creationId xmlns:a16="http://schemas.microsoft.com/office/drawing/2014/main" id="{B10868E2-F07B-3BF9-BC9A-672D49DB6363}"/>
-              </a:ext>
-            </a:extLst>
-          </p:cNvPr>
-          <p:cNvSpPr>
-            <a:spLocks noGrp="1"/>
-          </p:cNvSpPr>
-          <p:nvPr>
-            <p:ph idx="1"/>
-          </p:nvPr>
-        </p:nvSpPr>
-        <p:spPr/>
-        <p:txBody>
-          <a:bodyPr>
-            <a:normAutofit fontScale="92500" lnSpcReduction="20000"/>
-          </a:bodyPr>
-          <a:lstStyle/>
-          <a:p>
-            <a:r>
-              <a:rPr lang="nl-NL" dirty="0"/>
-              <a:t>MIM richt zich op </a:t>
-            </a:r>
-          </a:p>
-          <a:p>
-            <a:pPr lvl="1"/>
-            <a:r>
-              <a:rPr lang="nl-NL" dirty="0"/>
-              <a:t>het conceptueel model (niveau 2) </a:t>
-            </a:r>
-          </a:p>
-          <a:p>
-            <a:pPr lvl="1"/>
-            <a:r>
-              <a:rPr lang="nl-NL" dirty="0"/>
-              <a:t>het logisch model (niveau 3)</a:t>
-            </a:r>
-          </a:p>
-          <a:p>
-            <a:r>
-              <a:rPr lang="nl-NL" dirty="0"/>
-              <a:t>MIM is een gemeenschappelijk vertrekpunt voor het maken van informatiemodellen. </a:t>
-            </a:r>
-          </a:p>
-          <a:p>
-            <a:pPr lvl="1"/>
-            <a:r>
-              <a:rPr lang="nl-NL" dirty="0"/>
-              <a:t>Het model bevat </a:t>
-            </a:r>
-            <a:r>
-              <a:rPr lang="nl-NL" b="1" dirty="0"/>
-              <a:t>afspraken</a:t>
-            </a:r>
-            <a:r>
-              <a:rPr lang="nl-NL" dirty="0"/>
-              <a:t> over het vastleggen van gegevensspecificaties </a:t>
-            </a:r>
-          </a:p>
-          <a:p>
-            <a:pPr lvl="1"/>
-            <a:r>
-              <a:rPr lang="nl-NL" dirty="0"/>
-              <a:t>Het biedt ruimte aan de verschillende niveaus van modellering. </a:t>
-            </a:r>
-          </a:p>
-          <a:p>
-            <a:r>
-              <a:rPr lang="nl-NL" dirty="0"/>
-              <a:t>MIM is bestemd voor </a:t>
-            </a:r>
-          </a:p>
-          <a:p>
-            <a:pPr lvl="1"/>
-            <a:r>
-              <a:rPr lang="nl-NL" dirty="0"/>
-              <a:t>informatiearchitecten die informatiemodellen maken, </a:t>
-            </a:r>
-          </a:p>
-          <a:p>
-            <a:pPr lvl="1"/>
-            <a:r>
-              <a:rPr lang="nl-NL" dirty="0"/>
-              <a:t>informatieanalisten die willen weten wat de betekenis en definitie van informatieobjecten is </a:t>
-            </a:r>
-          </a:p>
-          <a:p>
-            <a:pPr lvl="1"/>
-            <a:r>
-              <a:rPr lang="nl-NL" dirty="0"/>
-              <a:t>en mensen die implementaties maken op basis van het model.</a:t>
-            </a:r>
-          </a:p>
-          <a:p>
-            <a:r>
-              <a:rPr lang="nl-NL" dirty="0"/>
-              <a:t>MIM richt zich op registraties binnen het overheidsdomein, maar is in bredere context inzetbaar</a:t>
-            </a:r>
-          </a:p>
-        </p:txBody>
-      </p:sp>
-      <p:sp>
-        <p:nvSpPr>
-          <p:cNvPr id="4" name="Tijdelijke aanduiding voor dianummer 3">
-            <a:extLst>
-              <a:ext uri="{FF2B5EF4-FFF2-40B4-BE49-F238E27FC236}">
-                <a16:creationId xmlns:a16="http://schemas.microsoft.com/office/drawing/2014/main" id="{2E40303F-0EAB-6D4A-BE96-B6F35FA0F172}"/>
-              </a:ext>
-            </a:extLst>
-          </p:cNvPr>
-          <p:cNvSpPr>
-            <a:spLocks noGrp="1"/>
-          </p:cNvSpPr>
-          <p:nvPr>
-            <p:ph type="sldNum" sz="quarter" idx="12"/>
-          </p:nvPr>
-        </p:nvSpPr>
-        <p:spPr/>
-        <p:txBody>
-          <a:bodyPr/>
-          <a:lstStyle/>
-          <a:p>
-            <a:fld id="{A648B885-FF76-47CB-8BBD-27E7EBF07CA9}" type="slidenum">
-              <a:rPr lang="nl-NL" smtClean="0"/>
-              <a:t>13</a:t>
-            </a:fld>
-            <a:endParaRPr lang="nl-NL"/>
-          </a:p>
-        </p:txBody>
-      </p:sp>
-      <p:pic>
-        <p:nvPicPr>
-          <p:cNvPr id="5" name="Picture 2" descr="metamodel informatiemodellering MIM">
-            <a:extLst>
-              <a:ext uri="{FF2B5EF4-FFF2-40B4-BE49-F238E27FC236}">
-                <a16:creationId xmlns:a16="http://schemas.microsoft.com/office/drawing/2014/main" id="{0CB7E4FD-775C-7FB3-3DD6-E444E04DB141}"/>
-              </a:ext>
-            </a:extLst>
-          </p:cNvPr>
-          <p:cNvPicPr>
-            <a:picLocks noChangeAspect="1" noChangeArrowheads="1"/>
-          </p:cNvPicPr>
-          <p:nvPr/>
-        </p:nvPicPr>
-        <p:blipFill>
-          <a:blip r:embed="rId2" cstate="print">
-            <a:extLst>
-              <a:ext uri="{28A0092B-C50C-407E-A947-70E740481C1C}">
-                <a14:useLocalDpi xmlns:a14="http://schemas.microsoft.com/office/drawing/2010/main" val="0"/>
-              </a:ext>
-            </a:extLst>
-          </a:blip>
-          <a:srcRect/>
-          <a:stretch>
-            <a:fillRect/>
-          </a:stretch>
-        </p:blipFill>
-        <p:spPr bwMode="auto">
-          <a:xfrm>
-            <a:off x="5488199" y="0"/>
-            <a:ext cx="3750070" cy="1875035"/>
-          </a:xfrm>
-          <a:prstGeom prst="rect">
-            <a:avLst/>
-          </a:prstGeom>
-          <a:noFill/>
-          <a:extLst>
-            <a:ext uri="{909E8E84-426E-40DD-AFC4-6F175D3DCCD1}">
-              <a14:hiddenFill xmlns:a14="http://schemas.microsoft.com/office/drawing/2010/main">
-                <a:solidFill>
-                  <a:srgbClr val="FFFFFF"/>
-                </a:solidFill>
-              </a14:hiddenFill>
-            </a:ext>
-          </a:extLst>
-        </p:spPr>
-      </p:pic>
-    </p:spTree>
-    <p:extLst>
-      <p:ext uri="{BB962C8B-B14F-4D97-AF65-F5344CB8AC3E}">
-        <p14:creationId xmlns:p14="http://schemas.microsoft.com/office/powerpoint/2010/main" val="4113844392"/>
-      </p:ext>
-    </p:extLst>
-  </p:cSld>
-  <p:clrMapOvr>
-    <a:masterClrMapping/>
-  </p:clrMapOvr>
-</p:sld>
-</file>
-
-<file path=ppt/slides/slide14.xml><?xml version="1.0" encoding="utf-8"?>
-<p:sld xmlns:a="http://schemas.openxmlformats.org/drawingml/2006/main" xmlns:r="http://schemas.openxmlformats.org/officeDocument/2006/relationships" xmlns:p="http://schemas.openxmlformats.org/presentationml/2006/main">
-  <p:cSld>
-    <p:spTree>
-      <p:nvGrpSpPr>
-        <p:cNvPr id="1" name=""/>
-        <p:cNvGrpSpPr/>
-        <p:nvPr/>
-      </p:nvGrpSpPr>
-      <p:grpSpPr>
-        <a:xfrm>
-          <a:off x="0" y="0"/>
-          <a:ext cx="0" cy="0"/>
-          <a:chOff x="0" y="0"/>
-          <a:chExt cx="0" cy="0"/>
-        </a:xfrm>
-      </p:grpSpPr>
-      <p:pic>
-        <p:nvPicPr>
-          <p:cNvPr id="8" name="Afbeelding 7">
-            <a:extLst>
-              <a:ext uri="{FF2B5EF4-FFF2-40B4-BE49-F238E27FC236}">
-                <a16:creationId xmlns:a16="http://schemas.microsoft.com/office/drawing/2014/main" id="{EDF0BCA2-517A-0BF6-14FF-603E9DEA9089}"/>
-              </a:ext>
-            </a:extLst>
-          </p:cNvPr>
-          <p:cNvPicPr>
-            <a:picLocks noChangeAspect="1"/>
-          </p:cNvPicPr>
-          <p:nvPr/>
-        </p:nvPicPr>
-        <p:blipFill>
-          <a:blip r:embed="rId2"/>
-          <a:stretch>
-            <a:fillRect/>
-          </a:stretch>
-        </p:blipFill>
-        <p:spPr>
-          <a:xfrm>
-            <a:off x="6194612" y="1221721"/>
-            <a:ext cx="5902299" cy="5331477"/>
-          </a:xfrm>
-          <a:prstGeom prst="rect">
-            <a:avLst/>
-          </a:prstGeom>
-        </p:spPr>
-      </p:pic>
-      <p:sp>
-        <p:nvSpPr>
-          <p:cNvPr id="4" name="Tijdelijke aanduiding voor dianummer 3">
-            <a:extLst>
-              <a:ext uri="{FF2B5EF4-FFF2-40B4-BE49-F238E27FC236}">
-                <a16:creationId xmlns:a16="http://schemas.microsoft.com/office/drawing/2014/main" id="{8B5B9F12-30DF-A785-D54D-7884F7E7F8D5}"/>
-              </a:ext>
-            </a:extLst>
-          </p:cNvPr>
-          <p:cNvSpPr>
-            <a:spLocks noGrp="1"/>
-          </p:cNvSpPr>
-          <p:nvPr>
-            <p:ph type="sldNum" sz="quarter" idx="12"/>
-          </p:nvPr>
-        </p:nvSpPr>
-        <p:spPr/>
-        <p:txBody>
-          <a:bodyPr/>
-          <a:lstStyle/>
-          <a:p>
-            <a:fld id="{A648B885-FF76-47CB-8BBD-27E7EBF07CA9}" type="slidenum">
-              <a:rPr lang="nl-NL" smtClean="0"/>
-              <a:t>14</a:t>
-            </a:fld>
-            <a:endParaRPr lang="nl-NL"/>
-          </a:p>
-        </p:txBody>
-      </p:sp>
-      <p:sp>
-        <p:nvSpPr>
-          <p:cNvPr id="11" name="Tijdelijke aanduiding voor inhoud 10">
-            <a:extLst>
-              <a:ext uri="{FF2B5EF4-FFF2-40B4-BE49-F238E27FC236}">
-                <a16:creationId xmlns:a16="http://schemas.microsoft.com/office/drawing/2014/main" id="{6AD1F20A-DD9E-AFB1-DE41-E63AE7F69902}"/>
-              </a:ext>
-            </a:extLst>
-          </p:cNvPr>
-          <p:cNvSpPr>
-            <a:spLocks noGrp="1"/>
-          </p:cNvSpPr>
-          <p:nvPr>
-            <p:ph idx="1"/>
-          </p:nvPr>
-        </p:nvSpPr>
-        <p:spPr>
-          <a:xfrm>
-            <a:off x="277907" y="209783"/>
-            <a:ext cx="8552328" cy="6427556"/>
-          </a:xfrm>
-          <a:solidFill>
-            <a:schemeClr val="bg1"/>
-          </a:solidFill>
-        </p:spPr>
-        <p:txBody>
-          <a:bodyPr>
-            <a:normAutofit fontScale="77500" lnSpcReduction="20000"/>
-          </a:bodyPr>
-          <a:lstStyle/>
-          <a:p>
-            <a:pPr marL="0" indent="0">
-              <a:buNone/>
-            </a:pPr>
-            <a:r>
-              <a:rPr lang="nl-NL" b="1" dirty="0"/>
-              <a:t>Onderdelen</a:t>
-            </a:r>
-          </a:p>
-          <a:p>
-            <a:r>
-              <a:rPr lang="nl-NL" dirty="0"/>
-              <a:t>Inleiding</a:t>
-            </a:r>
-          </a:p>
-          <a:p>
-            <a:pPr lvl="1"/>
-            <a:r>
-              <a:rPr lang="nl-NL" dirty="0"/>
-              <a:t>Wat is een informatiemodel</a:t>
-            </a:r>
-          </a:p>
-          <a:p>
-            <a:pPr lvl="1"/>
-            <a:r>
-              <a:rPr lang="nl-NL" dirty="0"/>
-              <a:t>Beschouwingsniveaus</a:t>
-            </a:r>
-          </a:p>
-          <a:p>
-            <a:pPr lvl="1"/>
-            <a:r>
-              <a:rPr lang="nl-NL" dirty="0"/>
-              <a:t>Wat is het metamodel voor informatiemodellering</a:t>
-            </a:r>
-          </a:p>
-          <a:p>
-            <a:r>
-              <a:rPr lang="nl-NL" dirty="0"/>
-              <a:t>Metamodel algemeen</a:t>
-            </a:r>
-          </a:p>
-          <a:p>
-            <a:pPr lvl="1"/>
-            <a:r>
-              <a:rPr lang="nl-NL" dirty="0"/>
-              <a:t>Uitgangspunten voor het model</a:t>
-            </a:r>
-          </a:p>
-          <a:p>
-            <a:pPr lvl="1"/>
-            <a:r>
-              <a:rPr lang="nl-NL" dirty="0"/>
-              <a:t>Structuur metamodel</a:t>
-            </a:r>
-          </a:p>
-          <a:p>
-            <a:pPr lvl="1"/>
-            <a:r>
-              <a:rPr lang="nl-NL" dirty="0"/>
-              <a:t>Modelelementen</a:t>
-            </a:r>
-          </a:p>
-          <a:p>
-            <a:pPr lvl="1"/>
-            <a:r>
-              <a:rPr lang="nl-NL" dirty="0"/>
-              <a:t>Specificatie metagegevens</a:t>
-            </a:r>
-          </a:p>
-          <a:p>
-            <a:r>
-              <a:rPr lang="nl-NL" dirty="0"/>
-              <a:t>Metamodel in UML</a:t>
-            </a:r>
-          </a:p>
-          <a:p>
-            <a:pPr lvl="1"/>
-            <a:r>
-              <a:rPr lang="nl-NL" dirty="0"/>
-              <a:t>Structuur metamodel in UML</a:t>
-            </a:r>
-          </a:p>
-          <a:p>
-            <a:pPr lvl="1"/>
-            <a:r>
-              <a:rPr lang="nl-NL" dirty="0"/>
-              <a:t>Specificatie metagegevens in UML</a:t>
-            </a:r>
-          </a:p>
-          <a:p>
-            <a:pPr lvl="1"/>
-            <a:r>
-              <a:rPr lang="nl-NL" dirty="0"/>
-              <a:t>UML tooling</a:t>
-            </a:r>
-          </a:p>
-          <a:p>
-            <a:r>
-              <a:rPr lang="nl-NL" dirty="0"/>
-              <a:t>Metamodel in Linked Data  (LD)</a:t>
-            </a:r>
-          </a:p>
-          <a:p>
-            <a:pPr lvl="1"/>
-            <a:r>
-              <a:rPr lang="nl-NL" dirty="0"/>
-              <a:t>Ontologisch model in LD</a:t>
-            </a:r>
-          </a:p>
-          <a:p>
-            <a:pPr lvl="1"/>
-            <a:r>
-              <a:rPr lang="nl-NL" dirty="0"/>
-              <a:t>Structuur metamodel in LD</a:t>
-            </a:r>
-          </a:p>
-          <a:p>
-            <a:pPr lvl="1"/>
-            <a:r>
-              <a:rPr lang="nl-NL" dirty="0"/>
-              <a:t>Specificatie metagegevens in LD</a:t>
-            </a:r>
-          </a:p>
-          <a:p>
-            <a:pPr lvl="1"/>
-            <a:r>
-              <a:rPr lang="nl-NL" dirty="0"/>
-              <a:t>Linked Data Tooling</a:t>
-            </a:r>
-          </a:p>
-          <a:p>
-            <a:r>
-              <a:rPr lang="nl-NL" dirty="0"/>
-              <a:t>Afspraken en Regels</a:t>
-            </a:r>
-          </a:p>
-          <a:p>
-            <a:r>
-              <a:rPr lang="nl-NL" dirty="0"/>
-              <a:t>Bijlagen</a:t>
-            </a:r>
-          </a:p>
-          <a:p>
-            <a:pPr lvl="1"/>
-            <a:endParaRPr lang="nl-NL" dirty="0"/>
-          </a:p>
-          <a:p>
-            <a:endParaRPr lang="nl-NL" dirty="0"/>
-          </a:p>
-        </p:txBody>
-      </p:sp>
-    </p:spTree>
-    <p:extLst>
-      <p:ext uri="{BB962C8B-B14F-4D97-AF65-F5344CB8AC3E}">
-        <p14:creationId xmlns:p14="http://schemas.microsoft.com/office/powerpoint/2010/main" val="2861324180"/>
-      </p:ext>
-    </p:extLst>
-  </p:cSld>
-  <p:clrMapOvr>
-    <a:masterClrMapping/>
-  </p:clrMapOvr>
-</p:sld>
-</file>
-
-<file path=ppt/slides/slide15.xml><?xml version="1.0" encoding="utf-8"?>
-<p:sld xmlns:a="http://schemas.openxmlformats.org/drawingml/2006/main" xmlns:r="http://schemas.openxmlformats.org/officeDocument/2006/relationships" xmlns:p="http://schemas.openxmlformats.org/presentationml/2006/main">
-  <p:cSld>
-    <p:spTree>
-      <p:nvGrpSpPr>
-        <p:cNvPr id="1" name=""/>
-        <p:cNvGrpSpPr/>
-        <p:nvPr/>
-      </p:nvGrpSpPr>
-      <p:grpSpPr>
-        <a:xfrm>
-          <a:off x="0" y="0"/>
-          <a:ext cx="0" cy="0"/>
-          <a:chOff x="0" y="0"/>
-          <a:chExt cx="0" cy="0"/>
-        </a:xfrm>
-      </p:grpSpPr>
-      <p:sp>
-        <p:nvSpPr>
-          <p:cNvPr id="5" name="Titel 4">
-            <a:extLst>
-              <a:ext uri="{FF2B5EF4-FFF2-40B4-BE49-F238E27FC236}">
-                <a16:creationId xmlns:a16="http://schemas.microsoft.com/office/drawing/2014/main" id="{29D0A527-4064-7EAD-2C3E-35DD39DA880B}"/>
-              </a:ext>
-            </a:extLst>
-          </p:cNvPr>
-          <p:cNvSpPr>
-            <a:spLocks noGrp="1"/>
-          </p:cNvSpPr>
-          <p:nvPr>
-            <p:ph type="title"/>
-          </p:nvPr>
-        </p:nvSpPr>
-        <p:spPr/>
-        <p:txBody>
-          <a:bodyPr/>
-          <a:lstStyle/>
-          <a:p>
-            <a:r>
-              <a:rPr lang="nl-NL" dirty="0"/>
-              <a:t>Waar staan we nu?</a:t>
-            </a:r>
-          </a:p>
-        </p:txBody>
-      </p:sp>
-      <p:sp>
-        <p:nvSpPr>
-          <p:cNvPr id="4" name="Tijdelijke aanduiding voor dianummer 3">
-            <a:extLst>
-              <a:ext uri="{FF2B5EF4-FFF2-40B4-BE49-F238E27FC236}">
-                <a16:creationId xmlns:a16="http://schemas.microsoft.com/office/drawing/2014/main" id="{7E2F0518-4FBB-0A51-9237-7A2949FBB180}"/>
-              </a:ext>
-            </a:extLst>
-          </p:cNvPr>
-          <p:cNvSpPr>
-            <a:spLocks noGrp="1"/>
-          </p:cNvSpPr>
-          <p:nvPr>
-            <p:ph type="sldNum" sz="quarter" idx="12"/>
-          </p:nvPr>
-        </p:nvSpPr>
-        <p:spPr/>
-        <p:txBody>
-          <a:bodyPr/>
-          <a:lstStyle/>
-          <a:p>
-            <a:fld id="{A648B885-FF76-47CB-8BBD-27E7EBF07CA9}" type="slidenum">
-              <a:rPr lang="nl-NL" smtClean="0"/>
-              <a:t>15</a:t>
-            </a:fld>
-            <a:endParaRPr lang="nl-NL"/>
-          </a:p>
-        </p:txBody>
-      </p:sp>
-    </p:spTree>
-    <p:extLst>
-      <p:ext uri="{BB962C8B-B14F-4D97-AF65-F5344CB8AC3E}">
-        <p14:creationId xmlns:p14="http://schemas.microsoft.com/office/powerpoint/2010/main" val="996105444"/>
-      </p:ext>
-    </p:extLst>
-  </p:cSld>
-  <p:clrMapOvr>
-    <a:masterClrMapping/>
-  </p:clrMapOvr>
-</p:sld>
-</file>
-
-<file path=ppt/slides/slide16.xml><?xml version="1.0" encoding="utf-8"?>
-<p:sld xmlns:a="http://schemas.openxmlformats.org/drawingml/2006/main" xmlns:r="http://schemas.openxmlformats.org/officeDocument/2006/relationships" xmlns:p="http://schemas.openxmlformats.org/presentationml/2006/main">
-  <p:cSld>
-    <p:spTree>
-      <p:nvGrpSpPr>
-        <p:cNvPr id="1" name=""/>
-        <p:cNvGrpSpPr/>
-        <p:nvPr/>
-      </p:nvGrpSpPr>
-      <p:grpSpPr>
-        <a:xfrm>
-          <a:off x="0" y="0"/>
-          <a:ext cx="0" cy="0"/>
-          <a:chOff x="0" y="0"/>
-          <a:chExt cx="0" cy="0"/>
-        </a:xfrm>
-      </p:grpSpPr>
-      <p:sp>
-        <p:nvSpPr>
-          <p:cNvPr id="5" name="Titel 4">
-            <a:extLst>
-              <a:ext uri="{FF2B5EF4-FFF2-40B4-BE49-F238E27FC236}">
-                <a16:creationId xmlns:a16="http://schemas.microsoft.com/office/drawing/2014/main" id="{AB366677-D3E4-33CA-69A2-9C8DFCDE9684}"/>
-              </a:ext>
-            </a:extLst>
-          </p:cNvPr>
-          <p:cNvSpPr>
-            <a:spLocks noGrp="1"/>
-          </p:cNvSpPr>
-          <p:nvPr>
-            <p:ph type="title"/>
-          </p:nvPr>
-        </p:nvSpPr>
-        <p:spPr/>
-        <p:txBody>
-          <a:bodyPr/>
-          <a:lstStyle/>
-          <a:p>
-            <a:r>
-              <a:rPr lang="nl-NL" dirty="0"/>
-              <a:t>Terugblik – doorontwikkeling MIM</a:t>
-            </a:r>
-          </a:p>
-        </p:txBody>
-      </p:sp>
-      <p:sp>
-        <p:nvSpPr>
-          <p:cNvPr id="6" name="Tijdelijke aanduiding voor inhoud 5">
-            <a:extLst>
-              <a:ext uri="{FF2B5EF4-FFF2-40B4-BE49-F238E27FC236}">
-                <a16:creationId xmlns:a16="http://schemas.microsoft.com/office/drawing/2014/main" id="{48A073F5-A938-6CD5-3F60-58270FB09999}"/>
-              </a:ext>
-            </a:extLst>
-          </p:cNvPr>
-          <p:cNvSpPr>
-            <a:spLocks noGrp="1"/>
-          </p:cNvSpPr>
-          <p:nvPr>
-            <p:ph idx="1"/>
-          </p:nvPr>
-        </p:nvSpPr>
-        <p:spPr>
-          <a:xfrm>
-            <a:off x="300038" y="1520825"/>
-            <a:ext cx="5384666" cy="4932363"/>
-          </a:xfrm>
-        </p:spPr>
-        <p:txBody>
-          <a:bodyPr/>
-          <a:lstStyle/>
-          <a:p>
-            <a:pPr marL="342900" lvl="0" indent="-342900">
-              <a:lnSpc>
-                <a:spcPct val="107000"/>
-              </a:lnSpc>
-              <a:buFont typeface="Symbol" panose="05050102010706020507" pitchFamily="18" charset="2"/>
-              <a:buChar char=""/>
-            </a:pPr>
-            <a:r>
-              <a:rPr lang="nl-NL" sz="1800" dirty="0">
-                <a:solidFill>
-                  <a:srgbClr val="3C3C3C"/>
-                </a:solidFill>
-                <a:latin typeface="Tenorite" panose="00000500000000000000" pitchFamily="2" charset="0"/>
-                <a:ea typeface="Tenorite" panose="00000500000000000000" pitchFamily="2" charset="0"/>
-                <a:cs typeface="Myanmar Text" panose="020B0502040204020203" pitchFamily="34" charset="0"/>
-              </a:rPr>
-              <a:t>2017 : KKG</a:t>
-            </a:r>
-            <a:br>
-              <a:rPr lang="nl-NL" sz="1800" dirty="0">
-                <a:solidFill>
-                  <a:srgbClr val="3C3C3C"/>
-                </a:solidFill>
-                <a:latin typeface="Tenorite" panose="00000500000000000000" pitchFamily="2" charset="0"/>
-                <a:ea typeface="Tenorite" panose="00000500000000000000" pitchFamily="2" charset="0"/>
-                <a:cs typeface="Myanmar Text" panose="020B0502040204020203" pitchFamily="34" charset="0"/>
-              </a:rPr>
-            </a:br>
-            <a:r>
-              <a:rPr lang="nl-NL" sz="1800" dirty="0">
-                <a:solidFill>
-                  <a:srgbClr val="3C3C3C"/>
-                </a:solidFill>
-                <a:latin typeface="Tenorite" panose="00000500000000000000" pitchFamily="2" charset="0"/>
-                <a:ea typeface="Tenorite" panose="00000500000000000000" pitchFamily="2" charset="0"/>
-                <a:cs typeface="Myanmar Text" panose="020B0502040204020203" pitchFamily="34" charset="0"/>
-              </a:rPr>
-              <a:t>Fundament gelegd door Kadaster, VNG en Geonovum </a:t>
-            </a:r>
-            <a:endParaRPr lang="nl-NL" sz="1800" dirty="0">
-              <a:solidFill>
-                <a:srgbClr val="3C3C3C"/>
-              </a:solidFill>
-              <a:effectLst/>
-              <a:latin typeface="Tenorite" panose="00000500000000000000" pitchFamily="2" charset="0"/>
-              <a:ea typeface="Tenorite" panose="00000500000000000000" pitchFamily="2" charset="0"/>
-              <a:cs typeface="Myanmar Text" panose="020B0502040204020203" pitchFamily="34" charset="0"/>
-            </a:endParaRPr>
-          </a:p>
-          <a:p>
-            <a:pPr marL="342900" lvl="0" indent="-342900">
-              <a:lnSpc>
-                <a:spcPct val="107000"/>
-              </a:lnSpc>
-              <a:buFont typeface="Symbol" panose="05050102010706020507" pitchFamily="18" charset="2"/>
-              <a:buChar char=""/>
-            </a:pPr>
-            <a:r>
-              <a:rPr lang="nl-NL" sz="1800" dirty="0">
-                <a:solidFill>
-                  <a:srgbClr val="3C3C3C"/>
-                </a:solidFill>
-                <a:effectLst/>
-                <a:latin typeface="Tenorite" panose="00000500000000000000" pitchFamily="2" charset="0"/>
-                <a:ea typeface="Tenorite" panose="00000500000000000000" pitchFamily="2" charset="0"/>
-                <a:cs typeface="Myanmar Text" panose="020B0502040204020203" pitchFamily="34" charset="0"/>
-              </a:rPr>
-              <a:t>2019 : MIM 1.0 (UML)</a:t>
-            </a:r>
-          </a:p>
-          <a:p>
-            <a:pPr marL="342900" lvl="0" indent="-342900">
-              <a:lnSpc>
-                <a:spcPct val="107000"/>
-              </a:lnSpc>
-              <a:buFont typeface="Symbol" panose="05050102010706020507" pitchFamily="18" charset="2"/>
-              <a:buChar char=""/>
-            </a:pPr>
-            <a:r>
-              <a:rPr lang="nl-NL" sz="1800" dirty="0">
-                <a:solidFill>
-                  <a:srgbClr val="3C3C3C"/>
-                </a:solidFill>
-                <a:effectLst/>
-                <a:latin typeface="Tenorite" panose="00000500000000000000" pitchFamily="2" charset="0"/>
-                <a:ea typeface="Tenorite" panose="00000500000000000000" pitchFamily="2" charset="0"/>
-                <a:cs typeface="Myanmar Text" panose="020B0502040204020203" pitchFamily="34" charset="0"/>
-              </a:rPr>
-              <a:t>2020 : MIM 1.1 (Algemeen + UML + Linked Data)</a:t>
-            </a:r>
-          </a:p>
-          <a:p>
-            <a:pPr marL="342900" lvl="0" indent="-342900">
-              <a:lnSpc>
-                <a:spcPct val="107000"/>
-              </a:lnSpc>
-              <a:buFont typeface="Symbol" panose="05050102010706020507" pitchFamily="18" charset="2"/>
-              <a:buChar char=""/>
-            </a:pPr>
-            <a:r>
-              <a:rPr lang="nl-NL" sz="1800" dirty="0">
-                <a:solidFill>
-                  <a:srgbClr val="3C3C3C"/>
-                </a:solidFill>
-                <a:effectLst/>
-                <a:latin typeface="Tenorite" panose="00000500000000000000" pitchFamily="2" charset="0"/>
-                <a:ea typeface="Tenorite" panose="00000500000000000000" pitchFamily="2" charset="0"/>
-                <a:cs typeface="Myanmar Text" panose="020B0502040204020203" pitchFamily="34" charset="0"/>
-              </a:rPr>
-              <a:t>2020 - MIM op </a:t>
-            </a:r>
-            <a:r>
-              <a:rPr lang="nl-NL" sz="1800" dirty="0">
-                <a:solidFill>
-                  <a:schemeClr val="accent1">
-                    <a:lumMod val="75000"/>
-                  </a:schemeClr>
-                </a:solidFill>
-                <a:effectLst/>
-                <a:latin typeface="Tenorite" panose="00000500000000000000" pitchFamily="2" charset="0"/>
-                <a:ea typeface="Tenorite" panose="00000500000000000000" pitchFamily="2" charset="0"/>
-                <a:cs typeface="Myanmar Text" panose="020B0502040204020203" pitchFamily="34" charset="0"/>
-              </a:rPr>
-              <a:t>Lijst aanbevolen standaarden </a:t>
-            </a:r>
-            <a:r>
-              <a:rPr lang="nl-NL" sz="1800" dirty="0">
-                <a:solidFill>
-                  <a:srgbClr val="3C3C3C"/>
-                </a:solidFill>
-                <a:effectLst/>
-                <a:latin typeface="Tenorite" panose="00000500000000000000" pitchFamily="2" charset="0"/>
-                <a:ea typeface="Tenorite" panose="00000500000000000000" pitchFamily="2" charset="0"/>
-                <a:cs typeface="Myanmar Text" panose="020B0502040204020203" pitchFamily="34" charset="0"/>
-              </a:rPr>
-              <a:t>van Forum Standaardisatie</a:t>
-            </a:r>
-          </a:p>
-          <a:p>
-            <a:pPr marL="342900" lvl="0" indent="-342900">
-              <a:lnSpc>
-                <a:spcPct val="107000"/>
-              </a:lnSpc>
-              <a:buFont typeface="Symbol" panose="05050102010706020507" pitchFamily="18" charset="2"/>
-              <a:buChar char=""/>
-            </a:pPr>
-            <a:r>
-              <a:rPr lang="nl-NL" sz="1800" dirty="0">
-                <a:solidFill>
-                  <a:srgbClr val="3C3C3C"/>
-                </a:solidFill>
-                <a:effectLst/>
-                <a:latin typeface="Tenorite" panose="00000500000000000000" pitchFamily="2" charset="0"/>
-                <a:ea typeface="Tenorite" panose="00000500000000000000" pitchFamily="2" charset="0"/>
-                <a:cs typeface="Myanmar Text" panose="020B0502040204020203" pitchFamily="34" charset="0"/>
-              </a:rPr>
-              <a:t>2021 – </a:t>
-            </a:r>
-            <a:r>
-              <a:rPr lang="nl-NL" sz="1800" b="1" dirty="0">
-                <a:solidFill>
-                  <a:srgbClr val="FFC000"/>
-                </a:solidFill>
-                <a:effectLst/>
-                <a:latin typeface="Tenorite" panose="00000500000000000000" pitchFamily="2" charset="0"/>
-                <a:ea typeface="Tenorite" panose="00000500000000000000" pitchFamily="2" charset="0"/>
-                <a:cs typeface="Myanmar Text" panose="020B0502040204020203" pitchFamily="34" charset="0"/>
-              </a:rPr>
-              <a:t>Oprichting MIM-community   </a:t>
-            </a:r>
-            <a:r>
-              <a:rPr lang="nl-NL" sz="1200" b="1" dirty="0">
-                <a:solidFill>
-                  <a:srgbClr val="000000"/>
-                </a:solidFill>
-                <a:effectLst/>
-                <a:latin typeface="Tenorite" panose="00000500000000000000" pitchFamily="2" charset="0"/>
-                <a:ea typeface="Tenorite" panose="00000500000000000000" pitchFamily="2" charset="0"/>
-                <a:cs typeface="Myanmar Text" panose="020B0502040204020203" pitchFamily="34" charset="0"/>
-              </a:rPr>
-              <a:t>(</a:t>
-            </a:r>
-            <a:r>
-              <a:rPr lang="nl-NL" sz="1200" dirty="0">
-                <a:solidFill>
-                  <a:srgbClr val="000000"/>
-                </a:solidFill>
-                <a:effectLst/>
-                <a:latin typeface="Tenorite" panose="00000500000000000000" pitchFamily="2" charset="0"/>
-                <a:ea typeface="Tenorite" panose="00000500000000000000" pitchFamily="2" charset="0"/>
-                <a:cs typeface="Myanmar Text" panose="020B0502040204020203" pitchFamily="34" charset="0"/>
-                <a:hlinkClick r:id="rId2">
-                  <a:extLst>
-                    <a:ext uri="{A12FA001-AC4F-418D-AE19-62706E023703}">
-                      <ahyp:hlinkClr xmlns:ahyp="http://schemas.microsoft.com/office/drawing/2018/hyperlinkcolor" val="tx"/>
-                    </a:ext>
-                  </a:extLst>
-                </a:hlinkClick>
-              </a:rPr>
-              <a:t>https://www.mim-community.nl/</a:t>
-            </a:r>
-            <a:r>
-              <a:rPr lang="nl-NL" sz="1200" dirty="0">
-                <a:solidFill>
-                  <a:srgbClr val="000000"/>
-                </a:solidFill>
-                <a:effectLst/>
-                <a:latin typeface="Tenorite" panose="00000500000000000000" pitchFamily="2" charset="0"/>
-                <a:ea typeface="Tenorite" panose="00000500000000000000" pitchFamily="2" charset="0"/>
-                <a:cs typeface="Myanmar Text" panose="020B0502040204020203" pitchFamily="34" charset="0"/>
-              </a:rPr>
-              <a:t> </a:t>
-            </a:r>
-            <a:r>
-              <a:rPr lang="nl-NL" sz="1200" b="1" dirty="0">
-                <a:solidFill>
-                  <a:srgbClr val="000000"/>
-                </a:solidFill>
-                <a:effectLst/>
-                <a:latin typeface="Tenorite" panose="00000500000000000000" pitchFamily="2" charset="0"/>
-                <a:ea typeface="Tenorite" panose="00000500000000000000" pitchFamily="2" charset="0"/>
-                <a:cs typeface="Myanmar Text" panose="020B0502040204020203" pitchFamily="34" charset="0"/>
-              </a:rPr>
-              <a:t>)</a:t>
-            </a:r>
-          </a:p>
-          <a:p>
-            <a:pPr marL="342900" lvl="0" indent="-342900">
-              <a:lnSpc>
-                <a:spcPct val="107000"/>
-              </a:lnSpc>
-              <a:buFont typeface="Symbol" panose="05050102010706020507" pitchFamily="18" charset="2"/>
-              <a:buChar char=""/>
-            </a:pPr>
-            <a:r>
-              <a:rPr lang="nl-NL" sz="1800" dirty="0">
-                <a:solidFill>
-                  <a:srgbClr val="3C3C3C"/>
-                </a:solidFill>
-                <a:effectLst/>
-                <a:latin typeface="Tenorite" panose="00000500000000000000" pitchFamily="2" charset="0"/>
-                <a:ea typeface="Tenorite" panose="00000500000000000000" pitchFamily="2" charset="0"/>
-                <a:cs typeface="Myanmar Text" panose="020B0502040204020203" pitchFamily="34" charset="0"/>
-              </a:rPr>
-              <a:t>2022- MIM 1.1.1</a:t>
-            </a:r>
-          </a:p>
-          <a:p>
-            <a:pPr marL="342900" lvl="0" indent="-342900">
-              <a:lnSpc>
-                <a:spcPct val="107000"/>
-              </a:lnSpc>
-              <a:buFont typeface="Symbol" panose="05050102010706020507" pitchFamily="18" charset="2"/>
-              <a:buChar char=""/>
-            </a:pPr>
-            <a:r>
-              <a:rPr lang="nl-NL" sz="1800" dirty="0">
-                <a:solidFill>
-                  <a:srgbClr val="3C3C3C"/>
-                </a:solidFill>
-                <a:effectLst/>
-                <a:latin typeface="Tenorite" panose="00000500000000000000" pitchFamily="2" charset="0"/>
-                <a:ea typeface="Tenorite" panose="00000500000000000000" pitchFamily="2" charset="0"/>
-                <a:cs typeface="Myanmar Text" panose="020B0502040204020203" pitchFamily="34" charset="0"/>
-              </a:rPr>
-              <a:t>2024 - MIM 1.2   </a:t>
-            </a:r>
-            <a:br>
-              <a:rPr lang="nl-NL" sz="1800" dirty="0">
-                <a:solidFill>
-                  <a:srgbClr val="3C3C3C"/>
-                </a:solidFill>
-                <a:effectLst/>
-                <a:latin typeface="Tenorite" panose="00000500000000000000" pitchFamily="2" charset="0"/>
-                <a:ea typeface="Tenorite" panose="00000500000000000000" pitchFamily="2" charset="0"/>
-                <a:cs typeface="Myanmar Text" panose="020B0502040204020203" pitchFamily="34" charset="0"/>
-              </a:rPr>
-            </a:br>
-            <a:r>
-              <a:rPr lang="nl-NL" sz="1800" dirty="0">
-                <a:solidFill>
-                  <a:srgbClr val="3C3C3C"/>
-                </a:solidFill>
-                <a:effectLst/>
-                <a:latin typeface="Tenorite" panose="00000500000000000000" pitchFamily="2" charset="0"/>
-                <a:ea typeface="Tenorite" panose="00000500000000000000" pitchFamily="2" charset="0"/>
-                <a:cs typeface="Myanmar Text" panose="020B0502040204020203" pitchFamily="34" charset="0"/>
-              </a:rPr>
-              <a:t>(</a:t>
-            </a:r>
-            <a:r>
-              <a:rPr lang="nl-NL" sz="1200" dirty="0">
-                <a:hlinkClick r:id="rId3"/>
-              </a:rPr>
-              <a:t>MIM - Metamodel Informatie Modellering (geostandaarden.nl)</a:t>
-            </a:r>
-            <a:r>
-              <a:rPr lang="nl-NL" sz="1800" dirty="0">
-                <a:solidFill>
-                  <a:srgbClr val="3C3C3C"/>
-                </a:solidFill>
-                <a:effectLst/>
-                <a:latin typeface="Tenorite" panose="00000500000000000000" pitchFamily="2" charset="0"/>
-                <a:ea typeface="Tenorite" panose="00000500000000000000" pitchFamily="2" charset="0"/>
-                <a:cs typeface="Myanmar Text" panose="020B0502040204020203" pitchFamily="34" charset="0"/>
-              </a:rPr>
-              <a:t> )</a:t>
-            </a:r>
-          </a:p>
-          <a:p>
-            <a:endParaRPr lang="nl-NL" dirty="0"/>
-          </a:p>
-        </p:txBody>
-      </p:sp>
-      <p:sp>
-        <p:nvSpPr>
-          <p:cNvPr id="4" name="Tijdelijke aanduiding voor dianummer 3">
-            <a:extLst>
-              <a:ext uri="{FF2B5EF4-FFF2-40B4-BE49-F238E27FC236}">
-                <a16:creationId xmlns:a16="http://schemas.microsoft.com/office/drawing/2014/main" id="{8B5B9F12-30DF-A785-D54D-7884F7E7F8D5}"/>
-              </a:ext>
-            </a:extLst>
-          </p:cNvPr>
-          <p:cNvSpPr>
-            <a:spLocks noGrp="1"/>
-          </p:cNvSpPr>
-          <p:nvPr>
-            <p:ph type="sldNum" sz="quarter" idx="12"/>
-          </p:nvPr>
-        </p:nvSpPr>
-        <p:spPr/>
-        <p:txBody>
-          <a:bodyPr/>
-          <a:lstStyle/>
-          <a:p>
-            <a:fld id="{A648B885-FF76-47CB-8BBD-27E7EBF07CA9}" type="slidenum">
-              <a:rPr lang="nl-NL" smtClean="0"/>
-              <a:t>16</a:t>
-            </a:fld>
-            <a:endParaRPr lang="nl-NL"/>
-          </a:p>
-        </p:txBody>
-      </p:sp>
-      <p:pic>
-        <p:nvPicPr>
-          <p:cNvPr id="3" name="Afbeelding 2">
-            <a:extLst>
-              <a:ext uri="{FF2B5EF4-FFF2-40B4-BE49-F238E27FC236}">
-                <a16:creationId xmlns:a16="http://schemas.microsoft.com/office/drawing/2014/main" id="{4B2D1FB2-41F4-BD6A-2D97-2B8C35CAE89D}"/>
-              </a:ext>
-            </a:extLst>
-          </p:cNvPr>
-          <p:cNvPicPr>
-            <a:picLocks noChangeAspect="1"/>
-          </p:cNvPicPr>
-          <p:nvPr/>
-        </p:nvPicPr>
-        <p:blipFill>
-          <a:blip r:embed="rId4"/>
-          <a:stretch>
-            <a:fillRect/>
-          </a:stretch>
-        </p:blipFill>
-        <p:spPr>
-          <a:xfrm>
-            <a:off x="6770714" y="3357361"/>
-            <a:ext cx="4934639" cy="2886478"/>
-          </a:xfrm>
-          <a:prstGeom prst="rect">
-            <a:avLst/>
-          </a:prstGeom>
-        </p:spPr>
-      </p:pic>
-      <p:sp>
-        <p:nvSpPr>
-          <p:cNvPr id="7" name="Rechthoek 6">
-            <a:extLst>
-              <a:ext uri="{FF2B5EF4-FFF2-40B4-BE49-F238E27FC236}">
-                <a16:creationId xmlns:a16="http://schemas.microsoft.com/office/drawing/2014/main" id="{92756721-2F10-36DA-C288-758EA0758872}"/>
-              </a:ext>
-            </a:extLst>
-          </p:cNvPr>
-          <p:cNvSpPr/>
-          <p:nvPr/>
-        </p:nvSpPr>
-        <p:spPr>
-          <a:xfrm>
-            <a:off x="6770714" y="3429000"/>
-            <a:ext cx="4727380" cy="2886478"/>
-          </a:xfrm>
-          <a:prstGeom prst="rect">
-            <a:avLst/>
-          </a:prstGeom>
-          <a:noFill/>
-          <a:ln w="25400">
-            <a:solidFill>
-              <a:schemeClr val="accent1"/>
-            </a:solidFill>
-          </a:ln>
-        </p:spPr>
-        <p:style>
-          <a:lnRef idx="2">
-            <a:schemeClr val="accent1">
-              <a:shade val="50000"/>
-            </a:schemeClr>
-          </a:lnRef>
-          <a:fillRef idx="1">
-            <a:schemeClr val="accent1"/>
-          </a:fillRef>
-          <a:effectRef idx="0">
-            <a:schemeClr val="accent1"/>
-          </a:effectRef>
-          <a:fontRef idx="minor">
-            <a:schemeClr val="lt1"/>
-          </a:fontRef>
-        </p:style>
-        <p:txBody>
-          <a:bodyPr rtlCol="0" anchor="ctr"/>
-          <a:lstStyle/>
-          <a:p>
-            <a:pPr algn="ctr"/>
-            <a:endParaRPr lang="nl-NL"/>
-          </a:p>
-        </p:txBody>
-      </p:sp>
-    </p:spTree>
-    <p:extLst>
-      <p:ext uri="{BB962C8B-B14F-4D97-AF65-F5344CB8AC3E}">
-        <p14:creationId xmlns:p14="http://schemas.microsoft.com/office/powerpoint/2010/main" val="1095002877"/>
-      </p:ext>
-    </p:extLst>
-  </p:cSld>
-  <p:clrMapOvr>
-    <a:masterClrMapping/>
-  </p:clrMapOvr>
-</p:sld>
-</file>
-
-<file path=ppt/slides/slide17.xml><?xml version="1.0" encoding="utf-8"?>
-<p:sld xmlns:a="http://schemas.openxmlformats.org/drawingml/2006/main" xmlns:r="http://schemas.openxmlformats.org/officeDocument/2006/relationships" xmlns:p="http://schemas.openxmlformats.org/presentationml/2006/main">
-  <p:cSld>
-    <p:spTree>
-      <p:nvGrpSpPr>
-        <p:cNvPr id="1" name=""/>
-        <p:cNvGrpSpPr/>
-        <p:nvPr/>
-      </p:nvGrpSpPr>
-      <p:grpSpPr>
-        <a:xfrm>
-          <a:off x="0" y="0"/>
-          <a:ext cx="0" cy="0"/>
-          <a:chOff x="0" y="0"/>
-          <a:chExt cx="0" cy="0"/>
-        </a:xfrm>
-      </p:grpSpPr>
-      <p:sp>
-        <p:nvSpPr>
-          <p:cNvPr id="5" name="Titel 4">
-            <a:extLst>
-              <a:ext uri="{FF2B5EF4-FFF2-40B4-BE49-F238E27FC236}">
-                <a16:creationId xmlns:a16="http://schemas.microsoft.com/office/drawing/2014/main" id="{AB366677-D3E4-33CA-69A2-9C8DFCDE9684}"/>
-              </a:ext>
-            </a:extLst>
-          </p:cNvPr>
-          <p:cNvSpPr>
-            <a:spLocks noGrp="1"/>
-          </p:cNvSpPr>
-          <p:nvPr>
-            <p:ph type="title"/>
-          </p:nvPr>
-        </p:nvSpPr>
-        <p:spPr/>
-        <p:txBody>
-          <a:bodyPr/>
-          <a:lstStyle/>
-          <a:p>
-            <a:r>
-              <a:rPr lang="nl-NL" dirty="0"/>
-              <a:t>Community                             </a:t>
-            </a:r>
-            <a:r>
-              <a:rPr lang="nl-NL" sz="2800" dirty="0"/>
-              <a:t>(mim-community.nl) </a:t>
-            </a:r>
-            <a:endParaRPr lang="nl-NL" dirty="0"/>
-          </a:p>
-        </p:txBody>
-      </p:sp>
-      <p:sp>
-        <p:nvSpPr>
-          <p:cNvPr id="6" name="Tijdelijke aanduiding voor inhoud 5">
-            <a:extLst>
-              <a:ext uri="{FF2B5EF4-FFF2-40B4-BE49-F238E27FC236}">
-                <a16:creationId xmlns:a16="http://schemas.microsoft.com/office/drawing/2014/main" id="{48A073F5-A938-6CD5-3F60-58270FB09999}"/>
-              </a:ext>
-            </a:extLst>
-          </p:cNvPr>
-          <p:cNvSpPr>
-            <a:spLocks noGrp="1"/>
-          </p:cNvSpPr>
-          <p:nvPr>
-            <p:ph sz="half" idx="1"/>
-          </p:nvPr>
-        </p:nvSpPr>
-        <p:spPr>
-          <a:xfrm>
-            <a:off x="300038" y="1520825"/>
-            <a:ext cx="6382864" cy="4932363"/>
-          </a:xfrm>
-        </p:spPr>
-        <p:txBody>
-          <a:bodyPr>
-            <a:normAutofit/>
-          </a:bodyPr>
-          <a:lstStyle/>
-          <a:p>
-            <a:pPr marL="0" lvl="0" indent="0">
-              <a:lnSpc>
-                <a:spcPct val="107000"/>
-              </a:lnSpc>
-              <a:buNone/>
-            </a:pPr>
-            <a:r>
-              <a:rPr lang="nl-NL" dirty="0">
-                <a:solidFill>
-                  <a:srgbClr val="3C3C3C"/>
-                </a:solidFill>
-                <a:latin typeface="Tenorite" panose="00000500000000000000" pitchFamily="2" charset="0"/>
-                <a:ea typeface="Tenorite" panose="00000500000000000000" pitchFamily="2" charset="0"/>
-                <a:cs typeface="Myanmar Text" panose="020B0502040204020203" pitchFamily="34" charset="0"/>
-              </a:rPr>
-              <a:t>Grote groep partijen die het toepassen, zoals:</a:t>
-            </a:r>
-          </a:p>
-          <a:p>
-            <a:pPr marL="342900" lvl="0" indent="-342900">
-              <a:lnSpc>
-                <a:spcPct val="107000"/>
-              </a:lnSpc>
-              <a:buFont typeface="Symbol" panose="05050102010706020507" pitchFamily="18" charset="2"/>
-              <a:buChar char=""/>
-            </a:pPr>
-            <a:r>
-              <a:rPr lang="nl-NL" dirty="0">
-                <a:solidFill>
-                  <a:srgbClr val="3C3C3C"/>
-                </a:solidFill>
-                <a:effectLst/>
-                <a:latin typeface="Tenorite" panose="00000500000000000000" pitchFamily="2" charset="0"/>
-                <a:ea typeface="Tenorite" panose="00000500000000000000" pitchFamily="2" charset="0"/>
-                <a:cs typeface="Myanmar Text" panose="020B0502040204020203" pitchFamily="34" charset="0"/>
-              </a:rPr>
-              <a:t>Kadaster</a:t>
-            </a:r>
-          </a:p>
-          <a:p>
-            <a:pPr marL="342900" lvl="0" indent="-342900">
-              <a:lnSpc>
-                <a:spcPct val="107000"/>
-              </a:lnSpc>
-              <a:buFont typeface="Symbol" panose="05050102010706020507" pitchFamily="18" charset="2"/>
-              <a:buChar char=""/>
-            </a:pPr>
-            <a:r>
-              <a:rPr lang="nl-NL" dirty="0">
-                <a:solidFill>
-                  <a:srgbClr val="3C3C3C"/>
-                </a:solidFill>
-                <a:latin typeface="Tenorite" panose="00000500000000000000" pitchFamily="2" charset="0"/>
-                <a:ea typeface="Tenorite" panose="00000500000000000000" pitchFamily="2" charset="0"/>
-                <a:cs typeface="Myanmar Text" panose="020B0502040204020203" pitchFamily="34" charset="0"/>
-              </a:rPr>
-              <a:t>VNG</a:t>
-            </a:r>
-          </a:p>
-          <a:p>
-            <a:pPr marL="342900" lvl="0" indent="-342900">
-              <a:lnSpc>
-                <a:spcPct val="107000"/>
-              </a:lnSpc>
-              <a:buFont typeface="Symbol" panose="05050102010706020507" pitchFamily="18" charset="2"/>
-              <a:buChar char=""/>
-            </a:pPr>
-            <a:r>
-              <a:rPr lang="nl-NL" dirty="0">
-                <a:solidFill>
-                  <a:srgbClr val="3C3C3C"/>
-                </a:solidFill>
-                <a:effectLst/>
-                <a:latin typeface="Tenorite" panose="00000500000000000000" pitchFamily="2" charset="0"/>
-                <a:ea typeface="Tenorite" panose="00000500000000000000" pitchFamily="2" charset="0"/>
-                <a:cs typeface="Myanmar Text" panose="020B0502040204020203" pitchFamily="34" charset="0"/>
-              </a:rPr>
-              <a:t>Geonovum</a:t>
-            </a:r>
-          </a:p>
-          <a:p>
-            <a:pPr marL="342900" lvl="0" indent="-342900">
-              <a:lnSpc>
-                <a:spcPct val="107000"/>
-              </a:lnSpc>
-              <a:buFont typeface="Symbol" panose="05050102010706020507" pitchFamily="18" charset="2"/>
-              <a:buChar char=""/>
-            </a:pPr>
-            <a:r>
-              <a:rPr lang="nl-NL" dirty="0">
-                <a:solidFill>
-                  <a:srgbClr val="3C3C3C"/>
-                </a:solidFill>
-                <a:latin typeface="Tenorite" panose="00000500000000000000" pitchFamily="2" charset="0"/>
-                <a:ea typeface="Tenorite" panose="00000500000000000000" pitchFamily="2" charset="0"/>
-                <a:cs typeface="Myanmar Text" panose="020B0502040204020203" pitchFamily="34" charset="0"/>
-              </a:rPr>
-              <a:t>Belastingdienst</a:t>
-            </a:r>
-          </a:p>
-          <a:p>
-            <a:pPr marL="342900" lvl="0" indent="-342900">
-              <a:lnSpc>
-                <a:spcPct val="107000"/>
-              </a:lnSpc>
-              <a:buFont typeface="Symbol" panose="05050102010706020507" pitchFamily="18" charset="2"/>
-              <a:buChar char=""/>
-            </a:pPr>
-            <a:r>
-              <a:rPr lang="nl-NL" dirty="0">
-                <a:solidFill>
-                  <a:srgbClr val="3C3C3C"/>
-                </a:solidFill>
-                <a:effectLst/>
-                <a:latin typeface="Tenorite" panose="00000500000000000000" pitchFamily="2" charset="0"/>
-                <a:ea typeface="Tenorite" panose="00000500000000000000" pitchFamily="2" charset="0"/>
-                <a:cs typeface="Myanmar Text" panose="020B0502040204020203" pitchFamily="34" charset="0"/>
-              </a:rPr>
-              <a:t>BZK – DSO (omgevingswet)</a:t>
-            </a:r>
-          </a:p>
-          <a:p>
-            <a:pPr marL="342900" lvl="0" indent="-342900">
-              <a:lnSpc>
-                <a:spcPct val="107000"/>
-              </a:lnSpc>
-              <a:buFont typeface="Symbol" panose="05050102010706020507" pitchFamily="18" charset="2"/>
-              <a:buChar char=""/>
-            </a:pPr>
-            <a:r>
-              <a:rPr lang="nl-NL" dirty="0">
-                <a:solidFill>
-                  <a:srgbClr val="3C3C3C"/>
-                </a:solidFill>
-                <a:latin typeface="Tenorite" panose="00000500000000000000" pitchFamily="2" charset="0"/>
-                <a:ea typeface="Tenorite" panose="00000500000000000000" pitchFamily="2" charset="0"/>
-                <a:cs typeface="Myanmar Text" panose="020B0502040204020203" pitchFamily="34" charset="0"/>
-              </a:rPr>
-              <a:t>BZK – TNO – Basisregistratie Ondergrond</a:t>
-            </a:r>
-          </a:p>
-          <a:p>
-            <a:pPr marL="342900" lvl="0" indent="-342900">
-              <a:lnSpc>
-                <a:spcPct val="107000"/>
-              </a:lnSpc>
-              <a:buFont typeface="Symbol" panose="05050102010706020507" pitchFamily="18" charset="2"/>
-              <a:buChar char=""/>
-            </a:pPr>
-            <a:r>
-              <a:rPr lang="nl-NL" dirty="0">
-                <a:solidFill>
-                  <a:srgbClr val="3C3C3C"/>
-                </a:solidFill>
-                <a:effectLst/>
-                <a:latin typeface="Tenorite" panose="00000500000000000000" pitchFamily="2" charset="0"/>
-                <a:ea typeface="Tenorite" panose="00000500000000000000" pitchFamily="2" charset="0"/>
-                <a:cs typeface="Myanmar Text" panose="020B0502040204020203" pitchFamily="34" charset="0"/>
-              </a:rPr>
-              <a:t>BZK – Zicht op Nederland</a:t>
-            </a:r>
-          </a:p>
-          <a:p>
-            <a:endParaRPr lang="nl-NL" dirty="0"/>
-          </a:p>
-        </p:txBody>
-      </p:sp>
-      <p:sp>
-        <p:nvSpPr>
-          <p:cNvPr id="2" name="Tijdelijke aanduiding voor inhoud 1">
-            <a:extLst>
-              <a:ext uri="{FF2B5EF4-FFF2-40B4-BE49-F238E27FC236}">
-                <a16:creationId xmlns:a16="http://schemas.microsoft.com/office/drawing/2014/main" id="{50EF793B-A2A9-20C8-CD5A-42B06C50C12A}"/>
-              </a:ext>
-            </a:extLst>
-          </p:cNvPr>
-          <p:cNvSpPr>
-            <a:spLocks noGrp="1"/>
-          </p:cNvSpPr>
-          <p:nvPr>
-            <p:ph sz="half" idx="2"/>
-          </p:nvPr>
-        </p:nvSpPr>
-        <p:spPr>
-          <a:xfrm>
-            <a:off x="6682902" y="2007879"/>
-            <a:ext cx="4304319" cy="4360196"/>
-          </a:xfrm>
-        </p:spPr>
-        <p:txBody>
-          <a:bodyPr/>
-          <a:lstStyle/>
-          <a:p>
-            <a:pPr marL="342900" lvl="0" indent="-342900">
-              <a:lnSpc>
-                <a:spcPct val="107000"/>
-              </a:lnSpc>
-              <a:buFont typeface="Symbol" panose="05050102010706020507" pitchFamily="18" charset="2"/>
-              <a:buChar char=""/>
-            </a:pPr>
-            <a:r>
-              <a:rPr lang="nl-NL" sz="2400" dirty="0">
-                <a:solidFill>
-                  <a:srgbClr val="3C3C3C"/>
-                </a:solidFill>
-                <a:latin typeface="Tenorite" panose="00000500000000000000" pitchFamily="2" charset="0"/>
-                <a:ea typeface="Tenorite" panose="00000500000000000000" pitchFamily="2" charset="0"/>
-                <a:cs typeface="Myanmar Text" panose="020B0502040204020203" pitchFamily="34" charset="0"/>
-              </a:rPr>
-              <a:t>Waarderingskamer</a:t>
-            </a:r>
-          </a:p>
-          <a:p>
-            <a:pPr marL="342900" lvl="0" indent="-342900">
-              <a:lnSpc>
-                <a:spcPct val="107000"/>
-              </a:lnSpc>
-              <a:buFont typeface="Symbol" panose="05050102010706020507" pitchFamily="18" charset="2"/>
-              <a:buChar char=""/>
-            </a:pPr>
-            <a:r>
-              <a:rPr lang="nl-NL" sz="2400" dirty="0">
-                <a:solidFill>
-                  <a:srgbClr val="3C3C3C"/>
-                </a:solidFill>
-                <a:effectLst/>
-                <a:latin typeface="Tenorite" panose="00000500000000000000" pitchFamily="2" charset="0"/>
-                <a:ea typeface="Tenorite" panose="00000500000000000000" pitchFamily="2" charset="0"/>
-                <a:cs typeface="Myanmar Text" panose="020B0502040204020203" pitchFamily="34" charset="0"/>
-              </a:rPr>
-              <a:t>DUO</a:t>
-            </a:r>
-          </a:p>
-          <a:p>
-            <a:pPr marL="342900" lvl="0" indent="-342900">
-              <a:lnSpc>
-                <a:spcPct val="107000"/>
-              </a:lnSpc>
-              <a:buFont typeface="Symbol" panose="05050102010706020507" pitchFamily="18" charset="2"/>
-              <a:buChar char=""/>
-            </a:pPr>
-            <a:r>
-              <a:rPr lang="nl-NL" sz="2400" dirty="0">
-                <a:solidFill>
-                  <a:srgbClr val="3C3C3C"/>
-                </a:solidFill>
-                <a:latin typeface="Tenorite" panose="00000500000000000000" pitchFamily="2" charset="0"/>
-                <a:ea typeface="Tenorite" panose="00000500000000000000" pitchFamily="2" charset="0"/>
-                <a:cs typeface="Myanmar Text" panose="020B0502040204020203" pitchFamily="34" charset="0"/>
-              </a:rPr>
-              <a:t>Onderwijsketen</a:t>
-            </a:r>
-          </a:p>
-          <a:p>
-            <a:pPr marL="342900" lvl="0" indent="-342900">
-              <a:lnSpc>
-                <a:spcPct val="107000"/>
-              </a:lnSpc>
-              <a:buFont typeface="Symbol" panose="05050102010706020507" pitchFamily="18" charset="2"/>
-              <a:buChar char=""/>
-            </a:pPr>
-            <a:r>
-              <a:rPr lang="nl-NL" sz="2400" dirty="0">
-                <a:solidFill>
-                  <a:srgbClr val="3C3C3C"/>
-                </a:solidFill>
-                <a:latin typeface="Tenorite" panose="00000500000000000000" pitchFamily="2" charset="0"/>
-                <a:ea typeface="Tenorite" panose="00000500000000000000" pitchFamily="2" charset="0"/>
-                <a:cs typeface="Myanmar Text" panose="020B0502040204020203" pitchFamily="34" charset="0"/>
-              </a:rPr>
-              <a:t>Politie</a:t>
-            </a:r>
-          </a:p>
-          <a:p>
-            <a:pPr marL="342900" lvl="0" indent="-342900">
-              <a:lnSpc>
-                <a:spcPct val="107000"/>
-              </a:lnSpc>
-              <a:buFont typeface="Symbol" panose="05050102010706020507" pitchFamily="18" charset="2"/>
-              <a:buChar char=""/>
-            </a:pPr>
-            <a:r>
-              <a:rPr lang="nl-NL" sz="2400" dirty="0">
-                <a:solidFill>
-                  <a:srgbClr val="3C3C3C"/>
-                </a:solidFill>
-                <a:effectLst/>
-                <a:latin typeface="Tenorite" panose="00000500000000000000" pitchFamily="2" charset="0"/>
-                <a:ea typeface="Tenorite" panose="00000500000000000000" pitchFamily="2" charset="0"/>
-                <a:cs typeface="Myanmar Text" panose="020B0502040204020203" pitchFamily="34" charset="0"/>
-              </a:rPr>
-              <a:t>Justitie</a:t>
-            </a:r>
-          </a:p>
-          <a:p>
-            <a:pPr marL="342900" lvl="0" indent="-342900">
-              <a:lnSpc>
-                <a:spcPct val="107000"/>
-              </a:lnSpc>
-              <a:buFont typeface="Symbol" panose="05050102010706020507" pitchFamily="18" charset="2"/>
-              <a:buChar char=""/>
-            </a:pPr>
-            <a:r>
-              <a:rPr lang="nl-NL" sz="2400" dirty="0">
-                <a:solidFill>
-                  <a:srgbClr val="3C3C3C"/>
-                </a:solidFill>
-                <a:latin typeface="Tenorite" panose="00000500000000000000" pitchFamily="2" charset="0"/>
-                <a:ea typeface="Tenorite" panose="00000500000000000000" pitchFamily="2" charset="0"/>
-                <a:cs typeface="Myanmar Text" panose="020B0502040204020203" pitchFamily="34" charset="0"/>
-              </a:rPr>
-              <a:t>KNB</a:t>
-            </a:r>
-          </a:p>
-          <a:p>
-            <a:pPr marL="342900" lvl="0" indent="-342900">
-              <a:lnSpc>
-                <a:spcPct val="107000"/>
-              </a:lnSpc>
-              <a:buFont typeface="Symbol" panose="05050102010706020507" pitchFamily="18" charset="2"/>
-              <a:buChar char=""/>
-            </a:pPr>
-            <a:r>
-              <a:rPr lang="nl-NL" sz="2400" dirty="0" err="1">
-                <a:solidFill>
-                  <a:srgbClr val="3C3C3C"/>
-                </a:solidFill>
-                <a:effectLst/>
-                <a:latin typeface="Tenorite" panose="00000500000000000000" pitchFamily="2" charset="0"/>
-                <a:ea typeface="Tenorite" panose="00000500000000000000" pitchFamily="2" charset="0"/>
-                <a:cs typeface="Myanmar Text" panose="020B0502040204020203" pitchFamily="34" charset="0"/>
-              </a:rPr>
-              <a:t>Etc</a:t>
-            </a:r>
-            <a:r>
-              <a:rPr lang="nl-NL" sz="2400" dirty="0">
-                <a:solidFill>
-                  <a:srgbClr val="3C3C3C"/>
-                </a:solidFill>
-                <a:effectLst/>
-                <a:latin typeface="Tenorite" panose="00000500000000000000" pitchFamily="2" charset="0"/>
-                <a:ea typeface="Tenorite" panose="00000500000000000000" pitchFamily="2" charset="0"/>
-                <a:cs typeface="Myanmar Text" panose="020B0502040204020203" pitchFamily="34" charset="0"/>
-              </a:rPr>
-              <a:t>, </a:t>
-            </a:r>
-            <a:r>
-              <a:rPr lang="nl-NL" sz="2400" dirty="0" err="1">
-                <a:solidFill>
-                  <a:srgbClr val="3C3C3C"/>
-                </a:solidFill>
-                <a:effectLst/>
-                <a:latin typeface="Tenorite" panose="00000500000000000000" pitchFamily="2" charset="0"/>
-                <a:ea typeface="Tenorite" panose="00000500000000000000" pitchFamily="2" charset="0"/>
-                <a:cs typeface="Myanmar Text" panose="020B0502040204020203" pitchFamily="34" charset="0"/>
-              </a:rPr>
-              <a:t>etc</a:t>
-            </a:r>
-            <a:endParaRPr lang="nl-NL" sz="2400" dirty="0">
-              <a:solidFill>
-                <a:srgbClr val="3C3C3C"/>
-              </a:solidFill>
-              <a:effectLst/>
-              <a:latin typeface="Tenorite" panose="00000500000000000000" pitchFamily="2" charset="0"/>
-              <a:ea typeface="Tenorite" panose="00000500000000000000" pitchFamily="2" charset="0"/>
-              <a:cs typeface="Myanmar Text" panose="020B0502040204020203" pitchFamily="34" charset="0"/>
-            </a:endParaRPr>
-          </a:p>
-          <a:p>
-            <a:endParaRPr lang="nl-NL" dirty="0"/>
-          </a:p>
-        </p:txBody>
-      </p:sp>
-      <p:sp>
-        <p:nvSpPr>
-          <p:cNvPr id="4" name="Tijdelijke aanduiding voor dianummer 3">
-            <a:extLst>
-              <a:ext uri="{FF2B5EF4-FFF2-40B4-BE49-F238E27FC236}">
-                <a16:creationId xmlns:a16="http://schemas.microsoft.com/office/drawing/2014/main" id="{8B5B9F12-30DF-A785-D54D-7884F7E7F8D5}"/>
-              </a:ext>
-            </a:extLst>
-          </p:cNvPr>
-          <p:cNvSpPr>
-            <a:spLocks noGrp="1"/>
-          </p:cNvSpPr>
-          <p:nvPr>
-            <p:ph type="sldNum" sz="quarter" idx="12"/>
-          </p:nvPr>
-        </p:nvSpPr>
-        <p:spPr/>
-        <p:txBody>
-          <a:bodyPr/>
-          <a:lstStyle/>
-          <a:p>
-            <a:fld id="{A648B885-FF76-47CB-8BBD-27E7EBF07CA9}" type="slidenum">
-              <a:rPr lang="nl-NL" smtClean="0"/>
-              <a:t>17</a:t>
-            </a:fld>
-            <a:endParaRPr lang="nl-NL"/>
-          </a:p>
-        </p:txBody>
-      </p:sp>
-    </p:spTree>
-    <p:extLst>
-      <p:ext uri="{BB962C8B-B14F-4D97-AF65-F5344CB8AC3E}">
-        <p14:creationId xmlns:p14="http://schemas.microsoft.com/office/powerpoint/2010/main" val="1329269755"/>
-      </p:ext>
-    </p:extLst>
-  </p:cSld>
-  <p:clrMapOvr>
-    <a:masterClrMapping/>
-  </p:clrMapOvr>
-</p:sld>
-</file>
-
-<file path=ppt/slides/slide18.xml><?xml version="1.0" encoding="utf-8"?>
-<p:sld xmlns:a="http://schemas.openxmlformats.org/drawingml/2006/main" xmlns:r="http://schemas.openxmlformats.org/officeDocument/2006/relationships" xmlns:p="http://schemas.openxmlformats.org/presentationml/2006/main">
-  <p:cSld>
-    <p:spTree>
-      <p:nvGrpSpPr>
-        <p:cNvPr id="1" name=""/>
-        <p:cNvGrpSpPr/>
-        <p:nvPr/>
-      </p:nvGrpSpPr>
-      <p:grpSpPr>
-        <a:xfrm>
-          <a:off x="0" y="0"/>
-          <a:ext cx="0" cy="0"/>
-          <a:chOff x="0" y="0"/>
-          <a:chExt cx="0" cy="0"/>
-        </a:xfrm>
-      </p:grpSpPr>
-      <p:sp>
-        <p:nvSpPr>
-          <p:cNvPr id="5" name="Titel 4">
-            <a:extLst>
-              <a:ext uri="{FF2B5EF4-FFF2-40B4-BE49-F238E27FC236}">
-                <a16:creationId xmlns:a16="http://schemas.microsoft.com/office/drawing/2014/main" id="{AEFCD52F-4E37-85FA-54CD-36253F286BEB}"/>
-              </a:ext>
-            </a:extLst>
-          </p:cNvPr>
-          <p:cNvSpPr>
-            <a:spLocks noGrp="1"/>
-          </p:cNvSpPr>
-          <p:nvPr>
-            <p:ph type="title"/>
-          </p:nvPr>
-        </p:nvSpPr>
-        <p:spPr/>
-        <p:txBody>
-          <a:bodyPr/>
-          <a:lstStyle/>
-          <a:p>
-            <a:r>
-              <a:rPr lang="nl-NL" dirty="0"/>
-              <a:t>Op weg naar MIM 2.0</a:t>
-            </a:r>
-          </a:p>
-        </p:txBody>
-      </p:sp>
-      <p:sp>
-        <p:nvSpPr>
-          <p:cNvPr id="4" name="Tijdelijke aanduiding voor dianummer 3">
-            <a:extLst>
-              <a:ext uri="{FF2B5EF4-FFF2-40B4-BE49-F238E27FC236}">
-                <a16:creationId xmlns:a16="http://schemas.microsoft.com/office/drawing/2014/main" id="{424A3128-B597-4299-0381-8ED42D14A8B8}"/>
-              </a:ext>
-            </a:extLst>
-          </p:cNvPr>
-          <p:cNvSpPr>
-            <a:spLocks noGrp="1"/>
-          </p:cNvSpPr>
-          <p:nvPr>
-            <p:ph type="sldNum" sz="quarter" idx="12"/>
-          </p:nvPr>
-        </p:nvSpPr>
-        <p:spPr/>
-        <p:txBody>
-          <a:bodyPr/>
-          <a:lstStyle/>
-          <a:p>
-            <a:fld id="{A648B885-FF76-47CB-8BBD-27E7EBF07CA9}" type="slidenum">
-              <a:rPr lang="nl-NL" smtClean="0"/>
-              <a:t>18</a:t>
-            </a:fld>
-            <a:endParaRPr lang="nl-NL"/>
-          </a:p>
-        </p:txBody>
-      </p:sp>
-    </p:spTree>
-    <p:extLst>
-      <p:ext uri="{BB962C8B-B14F-4D97-AF65-F5344CB8AC3E}">
-        <p14:creationId xmlns:p14="http://schemas.microsoft.com/office/powerpoint/2010/main" val="4069659024"/>
-      </p:ext>
-    </p:extLst>
-  </p:cSld>
-  <p:clrMapOvr>
-    <a:masterClrMapping/>
-  </p:clrMapOvr>
-</p:sld>
-</file>
-
-<file path=ppt/slides/slide19.xml><?xml version="1.0" encoding="utf-8"?>
-<p:sld xmlns:a="http://schemas.openxmlformats.org/drawingml/2006/main" xmlns:r="http://schemas.openxmlformats.org/officeDocument/2006/relationships" xmlns:p="http://schemas.openxmlformats.org/presentationml/2006/main">
-  <p:cSld>
-    <p:spTree>
-      <p:nvGrpSpPr>
-        <p:cNvPr id="1" name=""/>
-        <p:cNvGrpSpPr/>
-        <p:nvPr/>
-      </p:nvGrpSpPr>
-      <p:grpSpPr>
-        <a:xfrm>
-          <a:off x="0" y="0"/>
-          <a:ext cx="0" cy="0"/>
-          <a:chOff x="0" y="0"/>
-          <a:chExt cx="0" cy="0"/>
-        </a:xfrm>
-      </p:grpSpPr>
-      <p:sp>
-        <p:nvSpPr>
-          <p:cNvPr id="2" name="Titel 1">
-            <a:extLst>
-              <a:ext uri="{FF2B5EF4-FFF2-40B4-BE49-F238E27FC236}">
-                <a16:creationId xmlns:a16="http://schemas.microsoft.com/office/drawing/2014/main" id="{D4623A7B-A05E-859E-803C-0243FFFAF317}"/>
-              </a:ext>
-            </a:extLst>
-          </p:cNvPr>
-          <p:cNvSpPr>
-            <a:spLocks noGrp="1"/>
-          </p:cNvSpPr>
-          <p:nvPr>
-            <p:ph type="title"/>
-          </p:nvPr>
-        </p:nvSpPr>
-        <p:spPr/>
-        <p:txBody>
-          <a:bodyPr/>
-          <a:lstStyle/>
-          <a:p>
-            <a:r>
-              <a:rPr lang="nl-NL" dirty="0"/>
-              <a:t>MIM: Op weg naar 2.0</a:t>
-            </a:r>
-          </a:p>
-        </p:txBody>
-      </p:sp>
-      <p:sp>
-        <p:nvSpPr>
-          <p:cNvPr id="3" name="Tijdelijke aanduiding voor inhoud 2">
-            <a:extLst>
-              <a:ext uri="{FF2B5EF4-FFF2-40B4-BE49-F238E27FC236}">
-                <a16:creationId xmlns:a16="http://schemas.microsoft.com/office/drawing/2014/main" id="{AE28E926-9711-4629-0C5E-D5DE63D40BFC}"/>
-              </a:ext>
-            </a:extLst>
-          </p:cNvPr>
-          <p:cNvSpPr>
-            <a:spLocks noGrp="1"/>
-          </p:cNvSpPr>
-          <p:nvPr>
-            <p:ph idx="1"/>
-          </p:nvPr>
-        </p:nvSpPr>
-        <p:spPr/>
-        <p:txBody>
-          <a:bodyPr/>
-          <a:lstStyle/>
-          <a:p>
-            <a:r>
-              <a:rPr lang="nl-NL" dirty="0"/>
-              <a:t>Waar willen we heen</a:t>
-            </a:r>
-          </a:p>
-          <a:p>
-            <a:pPr lvl="1"/>
-            <a:r>
-              <a:rPr lang="nl-NL" dirty="0"/>
-              <a:t>Een volgende stap in volwassenheid, samen met de MIM community</a:t>
-            </a:r>
-          </a:p>
-          <a:p>
-            <a:r>
-              <a:rPr lang="nl-NL" dirty="0"/>
-              <a:t>Planning 2.0</a:t>
-            </a:r>
-          </a:p>
-          <a:p>
-            <a:pPr lvl="1"/>
-            <a:r>
-              <a:rPr lang="nl-NL" dirty="0"/>
-              <a:t>2024 – visie, met expertgroep en community</a:t>
-            </a:r>
-          </a:p>
-          <a:p>
-            <a:pPr lvl="1"/>
-            <a:r>
-              <a:rPr lang="nl-NL" dirty="0"/>
-              <a:t>2025 – ontwerp en ontwikkeling</a:t>
-            </a:r>
-          </a:p>
-          <a:p>
-            <a:pPr lvl="1"/>
-            <a:r>
-              <a:rPr lang="nl-NL" dirty="0"/>
-              <a:t>2026 – oplevering en vaststelling</a:t>
-            </a:r>
-          </a:p>
-          <a:p>
-            <a:endParaRPr lang="nl-NL" dirty="0"/>
-          </a:p>
-        </p:txBody>
-      </p:sp>
-      <p:sp>
-        <p:nvSpPr>
-          <p:cNvPr id="4" name="Tijdelijke aanduiding voor dianummer 3">
-            <a:extLst>
-              <a:ext uri="{FF2B5EF4-FFF2-40B4-BE49-F238E27FC236}">
-                <a16:creationId xmlns:a16="http://schemas.microsoft.com/office/drawing/2014/main" id="{7D519F51-1AFC-AF1E-C6EB-85956A3F5A06}"/>
-              </a:ext>
-            </a:extLst>
-          </p:cNvPr>
-          <p:cNvSpPr>
-            <a:spLocks noGrp="1"/>
-          </p:cNvSpPr>
-          <p:nvPr>
-            <p:ph type="sldNum" sz="quarter" idx="12"/>
-          </p:nvPr>
-        </p:nvSpPr>
-        <p:spPr/>
-        <p:txBody>
-          <a:bodyPr/>
-          <a:lstStyle/>
-          <a:p>
-            <a:fld id="{A648B885-FF76-47CB-8BBD-27E7EBF07CA9}" type="slidenum">
-              <a:rPr lang="nl-NL" smtClean="0"/>
-              <a:t>19</a:t>
-            </a:fld>
-            <a:endParaRPr lang="nl-NL"/>
-          </a:p>
-        </p:txBody>
-      </p:sp>
-      <p:pic>
-        <p:nvPicPr>
-          <p:cNvPr id="6" name="Afbeelding 5">
-            <a:extLst>
-              <a:ext uri="{FF2B5EF4-FFF2-40B4-BE49-F238E27FC236}">
-                <a16:creationId xmlns:a16="http://schemas.microsoft.com/office/drawing/2014/main" id="{D9C3D850-BA35-D560-C059-4A8D4F5EC448}"/>
-              </a:ext>
-            </a:extLst>
-          </p:cNvPr>
-          <p:cNvPicPr>
-            <a:picLocks noChangeAspect="1"/>
-          </p:cNvPicPr>
-          <p:nvPr/>
-        </p:nvPicPr>
-        <p:blipFill>
-          <a:blip r:embed="rId2"/>
-          <a:stretch>
-            <a:fillRect/>
-          </a:stretch>
-        </p:blipFill>
-        <p:spPr>
-          <a:xfrm>
-            <a:off x="7266562" y="3318614"/>
-            <a:ext cx="4621331" cy="3000104"/>
-          </a:xfrm>
-          <a:prstGeom prst="rect">
-            <a:avLst/>
-          </a:prstGeom>
-        </p:spPr>
-      </p:pic>
-    </p:spTree>
-    <p:extLst>
-      <p:ext uri="{BB962C8B-B14F-4D97-AF65-F5344CB8AC3E}">
-        <p14:creationId xmlns:p14="http://schemas.microsoft.com/office/powerpoint/2010/main" val="2840384359"/>
+        <p14:creationId xmlns:p14="http://schemas.microsoft.com/office/powerpoint/2010/main" val="430122001"/>
       </p:ext>
     </p:extLst>
   </p:cSld>
@@ -21579,7 +19700,7 @@
         </p:spPr>
         <p:txBody>
           <a:bodyPr>
-            <a:normAutofit fontScale="92500" lnSpcReduction="20000"/>
+            <a:normAutofit fontScale="77500" lnSpcReduction="20000"/>
           </a:bodyPr>
           <a:lstStyle/>
           <a:p>
@@ -21603,15 +19724,21 @@
           <a:p>
             <a:r>
               <a:rPr lang="nl-NL" sz="4800" dirty="0"/>
-              <a:t>MIM 2.0 </a:t>
+              <a:t>MIM 2.0 uitdaging – </a:t>
             </a:r>
             <a:r>
               <a:rPr lang="nl-NL" sz="4800" dirty="0" err="1"/>
-              <a:t>problem</a:t>
+              <a:t>use</a:t>
             </a:r>
             <a:r>
               <a:rPr lang="nl-NL" sz="4800" dirty="0"/>
-              <a:t> statement</a:t>
+              <a:t> case</a:t>
+            </a:r>
+          </a:p>
+          <a:p>
+            <a:r>
+              <a:rPr lang="nl-NL" sz="4800" dirty="0"/>
+              <a:t>MIM 2.0 begripsvorming</a:t>
             </a:r>
           </a:p>
           <a:p>
@@ -21656,64 +19783,6 @@
     <p:extLst>
       <p:ext uri="{BB962C8B-B14F-4D97-AF65-F5344CB8AC3E}">
         <p14:creationId xmlns:p14="http://schemas.microsoft.com/office/powerpoint/2010/main" val="1706522477"/>
-      </p:ext>
-    </p:extLst>
-  </p:cSld>
-  <p:clrMapOvr>
-    <a:masterClrMapping/>
-  </p:clrMapOvr>
-</p:sld>
-</file>
-
-<file path=ppt/slides/slide20.xml><?xml version="1.0" encoding="utf-8"?>
-<p:sld xmlns:a="http://schemas.openxmlformats.org/drawingml/2006/main" xmlns:r="http://schemas.openxmlformats.org/officeDocument/2006/relationships" xmlns:p="http://schemas.openxmlformats.org/presentationml/2006/main">
-  <p:cSld>
-    <p:spTree>
-      <p:nvGrpSpPr>
-        <p:cNvPr id="1" name=""/>
-        <p:cNvGrpSpPr/>
-        <p:nvPr/>
-      </p:nvGrpSpPr>
-      <p:grpSpPr>
-        <a:xfrm>
-          <a:off x="0" y="0"/>
-          <a:ext cx="0" cy="0"/>
-          <a:chOff x="0" y="0"/>
-          <a:chExt cx="0" cy="0"/>
-        </a:xfrm>
-      </p:grpSpPr>
-      <p:sp>
-        <p:nvSpPr>
-          <p:cNvPr id="4" name="Titel 3">
-            <a:extLst>
-              <a:ext uri="{FF2B5EF4-FFF2-40B4-BE49-F238E27FC236}">
-                <a16:creationId xmlns:a16="http://schemas.microsoft.com/office/drawing/2014/main" id="{CACBE8CC-58DC-1303-F27C-EB90E74D6549}"/>
-              </a:ext>
-            </a:extLst>
-          </p:cNvPr>
-          <p:cNvSpPr>
-            <a:spLocks noGrp="1"/>
-          </p:cNvSpPr>
-          <p:nvPr>
-            <p:ph type="title"/>
-          </p:nvPr>
-        </p:nvSpPr>
-        <p:spPr/>
-        <p:txBody>
-          <a:bodyPr/>
-          <a:lstStyle/>
-          <a:p>
-            <a:r>
-              <a:rPr lang="nl-NL" dirty="0"/>
-              <a:t>Bedankt!</a:t>
-            </a:r>
-          </a:p>
-        </p:txBody>
-      </p:sp>
-    </p:spTree>
-    <p:extLst>
-      <p:ext uri="{BB962C8B-B14F-4D97-AF65-F5344CB8AC3E}">
-        <p14:creationId xmlns:p14="http://schemas.microsoft.com/office/powerpoint/2010/main" val="430122001"/>
       </p:ext>
     </p:extLst>
   </p:cSld>
@@ -22438,8 +20507,12 @@
           </a:p>
           <a:p>
             <a:r>
+              <a:rPr lang="nl-NL"/>
+              <a:t>VNG </a:t>
+            </a:r>
+            <a:r>
               <a:rPr lang="nl-NL" dirty="0"/>
-              <a:t>VNG</a:t>
+              <a:t>Realisatie</a:t>
             </a:r>
           </a:p>
           <a:p>
@@ -22692,10 +20765,10 @@
       </p:pic>
       <p:pic>
         <p:nvPicPr>
-          <p:cNvPr id="1032" name="Picture 8" descr="Robert Melskens">
-            <a:extLst>
-              <a:ext uri="{FF2B5EF4-FFF2-40B4-BE49-F238E27FC236}">
-                <a16:creationId xmlns:a16="http://schemas.microsoft.com/office/drawing/2014/main" id="{E6E02C53-6372-EE27-A61D-844F10CB90FF}"/>
+          <p:cNvPr id="1034" name="Picture 10" descr="Thies Mesdag">
+            <a:extLst>
+              <a:ext uri="{FF2B5EF4-FFF2-40B4-BE49-F238E27FC236}">
+                <a16:creationId xmlns:a16="http://schemas.microsoft.com/office/drawing/2014/main" id="{1C39C875-BCA3-C8A4-BF8E-FA5FB845E2F2}"/>
               </a:ext>
             </a:extLst>
           </p:cNvPr>
@@ -22719,7 +20792,7 @@
         </p:blipFill>
         <p:spPr bwMode="auto">
           <a:xfrm>
-            <a:off x="10359011" y="1520825"/>
+            <a:off x="6769475" y="3779235"/>
             <a:ext cx="1080000" cy="1080000"/>
           </a:xfrm>
           <a:prstGeom prst="rect">
@@ -22739,10 +20812,10 @@
       </p:pic>
       <p:pic>
         <p:nvPicPr>
-          <p:cNvPr id="1034" name="Picture 10" descr="Thies Mesdag">
-            <a:extLst>
-              <a:ext uri="{FF2B5EF4-FFF2-40B4-BE49-F238E27FC236}">
-                <a16:creationId xmlns:a16="http://schemas.microsoft.com/office/drawing/2014/main" id="{1C39C875-BCA3-C8A4-BF8E-FA5FB845E2F2}"/>
+          <p:cNvPr id="1036" name="Picture 12" descr="Paul Janssen">
+            <a:extLst>
+              <a:ext uri="{FF2B5EF4-FFF2-40B4-BE49-F238E27FC236}">
+                <a16:creationId xmlns:a16="http://schemas.microsoft.com/office/drawing/2014/main" id="{AD653189-8CA8-E10C-07B7-A1EB46EAB0E3}"/>
               </a:ext>
             </a:extLst>
           </p:cNvPr>
@@ -22766,7 +20839,7 @@
         </p:blipFill>
         <p:spPr bwMode="auto">
           <a:xfrm>
-            <a:off x="6769475" y="3779235"/>
+            <a:off x="8395431" y="4066294"/>
             <a:ext cx="1080000" cy="1080000"/>
           </a:xfrm>
           <a:prstGeom prst="rect">
@@ -22786,10 +20859,10 @@
       </p:pic>
       <p:pic>
         <p:nvPicPr>
-          <p:cNvPr id="1036" name="Picture 12" descr="Paul Janssen">
-            <a:extLst>
-              <a:ext uri="{FF2B5EF4-FFF2-40B4-BE49-F238E27FC236}">
-                <a16:creationId xmlns:a16="http://schemas.microsoft.com/office/drawing/2014/main" id="{AD653189-8CA8-E10C-07B7-A1EB46EAB0E3}"/>
+          <p:cNvPr id="1038" name="Picture 14" descr="Danny Greefhorst">
+            <a:extLst>
+              <a:ext uri="{FF2B5EF4-FFF2-40B4-BE49-F238E27FC236}">
+                <a16:creationId xmlns:a16="http://schemas.microsoft.com/office/drawing/2014/main" id="{9F8D76B0-8ADA-B1A4-D780-9B7DA0BFE5F7}"/>
               </a:ext>
             </a:extLst>
           </p:cNvPr>
@@ -22813,7 +20886,7 @@
         </p:blipFill>
         <p:spPr bwMode="auto">
           <a:xfrm>
-            <a:off x="8395431" y="4066294"/>
+            <a:off x="6894024" y="2145343"/>
             <a:ext cx="1080000" cy="1080000"/>
           </a:xfrm>
           <a:prstGeom prst="rect">
@@ -22833,10 +20906,10 @@
       </p:pic>
       <p:pic>
         <p:nvPicPr>
-          <p:cNvPr id="1038" name="Picture 14" descr="Danny Greefhorst">
-            <a:extLst>
-              <a:ext uri="{FF2B5EF4-FFF2-40B4-BE49-F238E27FC236}">
-                <a16:creationId xmlns:a16="http://schemas.microsoft.com/office/drawing/2014/main" id="{9F8D76B0-8ADA-B1A4-D780-9B7DA0BFE5F7}"/>
+          <p:cNvPr id="1042" name="Picture 18" descr="@plbt5">
+            <a:extLst>
+              <a:ext uri="{FF2B5EF4-FFF2-40B4-BE49-F238E27FC236}">
+                <a16:creationId xmlns:a16="http://schemas.microsoft.com/office/drawing/2014/main" id="{BD1DDFA5-2F5D-9908-BA70-6A32A3A34483}"/>
               </a:ext>
             </a:extLst>
           </p:cNvPr>
@@ -22860,7 +20933,7 @@
         </p:blipFill>
         <p:spPr bwMode="auto">
           <a:xfrm>
-            <a:off x="6894024" y="2145343"/>
+            <a:off x="10257589" y="5006943"/>
             <a:ext cx="1080000" cy="1080000"/>
           </a:xfrm>
           <a:prstGeom prst="rect">
@@ -22880,10 +20953,10 @@
       </p:pic>
       <p:pic>
         <p:nvPicPr>
-          <p:cNvPr id="1042" name="Picture 18" descr="@plbt5">
-            <a:extLst>
-              <a:ext uri="{FF2B5EF4-FFF2-40B4-BE49-F238E27FC236}">
-                <a16:creationId xmlns:a16="http://schemas.microsoft.com/office/drawing/2014/main" id="{BD1DDFA5-2F5D-9908-BA70-6A32A3A34483}"/>
+          <p:cNvPr id="1044" name="Picture 20" descr="Niels Hoffmann">
+            <a:extLst>
+              <a:ext uri="{FF2B5EF4-FFF2-40B4-BE49-F238E27FC236}">
+                <a16:creationId xmlns:a16="http://schemas.microsoft.com/office/drawing/2014/main" id="{B4CEC416-FA2C-6E41-F80B-91CBAA2A44F4}"/>
               </a:ext>
             </a:extLst>
           </p:cNvPr>
@@ -22907,7 +20980,7 @@
         </p:blipFill>
         <p:spPr bwMode="auto">
           <a:xfrm>
-            <a:off x="10257589" y="5006943"/>
+            <a:off x="8886786" y="5371088"/>
             <a:ext cx="1080000" cy="1080000"/>
           </a:xfrm>
           <a:prstGeom prst="rect">
@@ -22927,15 +21000,15 @@
       </p:pic>
       <p:pic>
         <p:nvPicPr>
-          <p:cNvPr id="1044" name="Picture 20" descr="Niels Hoffmann">
-            <a:extLst>
-              <a:ext uri="{FF2B5EF4-FFF2-40B4-BE49-F238E27FC236}">
-                <a16:creationId xmlns:a16="http://schemas.microsoft.com/office/drawing/2014/main" id="{B4CEC416-FA2C-6E41-F80B-91CBAA2A44F4}"/>
+          <p:cNvPr id="8" name="Afbeelding 7" descr="Afbeelding met Menselijk gezicht, Voorhoofd, persoon, Kin&#10;&#10;Door AI gegenereerde inhoud is mogelijk onjuist.">
+            <a:extLst>
+              <a:ext uri="{FF2B5EF4-FFF2-40B4-BE49-F238E27FC236}">
+                <a16:creationId xmlns:a16="http://schemas.microsoft.com/office/drawing/2014/main" id="{2DD8BEEE-FC6B-7E1B-33DF-E5DD9BDA28DF}"/>
               </a:ext>
             </a:extLst>
           </p:cNvPr>
           <p:cNvPicPr>
-            <a:picLocks noChangeAspect="1" noChangeArrowheads="1"/>
+            <a:picLocks noChangeAspect="1"/>
           </p:cNvPicPr>
           <p:nvPr/>
         </p:nvPicPr>
@@ -22947,37 +21020,26 @@
               </a:ext>
             </a:extLst>
           </a:blip>
-          <a:srcRect/>
           <a:stretch>
             <a:fillRect/>
           </a:stretch>
         </p:blipFill>
-        <p:spPr bwMode="auto">
-          <a:xfrm>
-            <a:off x="8886786" y="5371088"/>
-            <a:ext cx="1080000" cy="1080000"/>
+        <p:spPr>
+          <a:xfrm>
+            <a:off x="6959495" y="5263542"/>
+            <a:ext cx="1080000" cy="1274338"/>
           </a:xfrm>
           <a:prstGeom prst="rect">
             <a:avLst/>
           </a:prstGeom>
-          <a:noFill/>
-          <a:extLst>
-            <a:ext uri="{909E8E84-426E-40DD-AFC4-6F175D3DCCD1}">
-              <a14:hiddenFill xmlns:a14="http://schemas.microsoft.com/office/drawing/2010/main">
-                <a:solidFill>
-                  <a:srgbClr val="FFFFFF"/>
-                </a:solidFill>
-              </a14:hiddenFill>
-            </a:ext>
-          </a:extLst>
         </p:spPr>
       </p:pic>
       <p:pic>
         <p:nvPicPr>
-          <p:cNvPr id="8" name="Afbeelding 7" descr="Afbeelding met Menselijk gezicht, Voorhoofd, persoon, Kin&#10;&#10;Door AI gegenereerde inhoud is mogelijk onjuist.">
-            <a:extLst>
-              <a:ext uri="{FF2B5EF4-FFF2-40B4-BE49-F238E27FC236}">
-                <a16:creationId xmlns:a16="http://schemas.microsoft.com/office/drawing/2014/main" id="{2DD8BEEE-FC6B-7E1B-33DF-E5DD9BDA28DF}"/>
+          <p:cNvPr id="9" name="Afbeelding 8" descr="Afbeelding met Menselijk gezicht, persoon, Voorhoofd, kleding&#10;&#10;Door AI gegenereerde inhoud is mogelijk onjuist.">
+            <a:extLst>
+              <a:ext uri="{FF2B5EF4-FFF2-40B4-BE49-F238E27FC236}">
+                <a16:creationId xmlns:a16="http://schemas.microsoft.com/office/drawing/2014/main" id="{2B674F9A-D1AE-CF37-5688-409D0D492922}"/>
               </a:ext>
             </a:extLst>
           </p:cNvPr>
@@ -23000,8 +21062,8 @@
         </p:blipFill>
         <p:spPr>
           <a:xfrm>
-            <a:off x="6959495" y="5263542"/>
-            <a:ext cx="1080000" cy="1274338"/>
+            <a:off x="10168662" y="1339530"/>
+            <a:ext cx="1080000" cy="1290685"/>
           </a:xfrm>
           <a:prstGeom prst="rect">
             <a:avLst/>
@@ -24113,10 +22175,108 @@
       </p:grpSpPr>
       <p:sp>
         <p:nvSpPr>
+          <p:cNvPr id="6" name="Rechthoek 5">
+            <a:extLst>
+              <a:ext uri="{FF2B5EF4-FFF2-40B4-BE49-F238E27FC236}">
+                <a16:creationId xmlns:a16="http://schemas.microsoft.com/office/drawing/2014/main" id="{6062DA04-B2CB-76B8-5091-18EAE2AA6AF7}"/>
+              </a:ext>
+            </a:extLst>
+          </p:cNvPr>
+          <p:cNvSpPr/>
+          <p:nvPr/>
+        </p:nvSpPr>
+        <p:spPr>
+          <a:xfrm>
+            <a:off x="3345830" y="3429000"/>
+            <a:ext cx="1656271" cy="810883"/>
+          </a:xfrm>
+          <a:prstGeom prst="rect">
+            <a:avLst/>
+          </a:prstGeom>
+          <a:ln>
+            <a:noFill/>
+          </a:ln>
+        </p:spPr>
+        <p:style>
+          <a:lnRef idx="2">
+            <a:schemeClr val="accent1">
+              <a:shade val="50000"/>
+            </a:schemeClr>
+          </a:lnRef>
+          <a:fillRef idx="1">
+            <a:schemeClr val="accent1"/>
+          </a:fillRef>
+          <a:effectRef idx="0">
+            <a:schemeClr val="accent1"/>
+          </a:effectRef>
+          <a:fontRef idx="minor">
+            <a:schemeClr val="lt1"/>
+          </a:fontRef>
+        </p:style>
+        <p:txBody>
+          <a:bodyPr rtlCol="0" anchor="ctr"/>
+          <a:lstStyle/>
+          <a:p>
+            <a:pPr algn="ctr"/>
+            <a:endParaRPr lang="nl-NL"/>
+          </a:p>
+        </p:txBody>
+      </p:sp>
+      <p:sp>
+        <p:nvSpPr>
+          <p:cNvPr id="7" name="Rechthoek 6">
+            <a:extLst>
+              <a:ext uri="{FF2B5EF4-FFF2-40B4-BE49-F238E27FC236}">
+                <a16:creationId xmlns:a16="http://schemas.microsoft.com/office/drawing/2014/main" id="{11B46E41-540D-BD84-2112-8B828AD0E8E7}"/>
+              </a:ext>
+            </a:extLst>
+          </p:cNvPr>
+          <p:cNvSpPr/>
+          <p:nvPr/>
+        </p:nvSpPr>
+        <p:spPr>
+          <a:xfrm>
+            <a:off x="6595113" y="3429000"/>
+            <a:ext cx="1656271" cy="810883"/>
+          </a:xfrm>
+          <a:prstGeom prst="rect">
+            <a:avLst/>
+          </a:prstGeom>
+          <a:ln>
+            <a:noFill/>
+          </a:ln>
+        </p:spPr>
+        <p:style>
+          <a:lnRef idx="2">
+            <a:schemeClr val="accent1">
+              <a:shade val="50000"/>
+            </a:schemeClr>
+          </a:lnRef>
+          <a:fillRef idx="1">
+            <a:schemeClr val="accent1"/>
+          </a:fillRef>
+          <a:effectRef idx="0">
+            <a:schemeClr val="accent1"/>
+          </a:effectRef>
+          <a:fontRef idx="minor">
+            <a:schemeClr val="lt1"/>
+          </a:fontRef>
+        </p:style>
+        <p:txBody>
+          <a:bodyPr rtlCol="0" anchor="ctr"/>
+          <a:lstStyle/>
+          <a:p>
+            <a:pPr algn="ctr"/>
+            <a:endParaRPr lang="nl-NL"/>
+          </a:p>
+        </p:txBody>
+      </p:sp>
+      <p:sp>
+        <p:nvSpPr>
           <p:cNvPr id="2" name="Titel 1">
             <a:extLst>
               <a:ext uri="{FF2B5EF4-FFF2-40B4-BE49-F238E27FC236}">
-                <a16:creationId xmlns:a16="http://schemas.microsoft.com/office/drawing/2014/main" id="{22DC561B-9BC8-2608-6CCA-CBFB54894B04}"/>
+                <a16:creationId xmlns:a16="http://schemas.microsoft.com/office/drawing/2014/main" id="{8D79B5E6-AD47-950F-9306-616E6DB135AD}"/>
               </a:ext>
             </a:extLst>
           </p:cNvPr>
@@ -24134,7 +22294,7 @@
           <a:p>
             <a:r>
               <a:rPr lang="nl-NL" dirty="0"/>
-              <a:t>Schets metamodel MIM-CIM</a:t>
+              <a:t>Waar we nu zijn met formeel uitdrukken van het metamodel</a:t>
             </a:r>
           </a:p>
         </p:txBody>
@@ -24144,7 +22304,7 @@
           <p:cNvPr id="3" name="Tijdelijke aanduiding voor inhoud 2">
             <a:extLst>
               <a:ext uri="{FF2B5EF4-FFF2-40B4-BE49-F238E27FC236}">
-                <a16:creationId xmlns:a16="http://schemas.microsoft.com/office/drawing/2014/main" id="{024CFC2D-3582-B578-98CB-61167870D8C3}"/>
+                <a16:creationId xmlns:a16="http://schemas.microsoft.com/office/drawing/2014/main" id="{642CAA21-9E39-3B8D-7B29-0D1856623A0D}"/>
               </a:ext>
             </a:extLst>
           </p:cNvPr>
@@ -24155,12 +22315,20 @@
             <p:ph idx="1"/>
           </p:nvPr>
         </p:nvSpPr>
-        <p:spPr/>
+        <p:spPr>
+          <a:xfrm>
+            <a:off x="300038" y="1925637"/>
+            <a:ext cx="11587855" cy="989013"/>
+          </a:xfrm>
+        </p:spPr>
         <p:txBody>
           <a:bodyPr/>
           <a:lstStyle/>
           <a:p>
-            <a:endParaRPr lang="nl-NL"/>
+            <a:r>
+              <a:rPr lang="nl-NL" dirty="0"/>
+              <a:t>MIM in MIM uitdrukken</a:t>
+            </a:r>
           </a:p>
         </p:txBody>
       </p:sp>
@@ -24169,7 +22337,7 @@
           <p:cNvPr id="4" name="Tijdelijke aanduiding voor dianummer 3">
             <a:extLst>
               <a:ext uri="{FF2B5EF4-FFF2-40B4-BE49-F238E27FC236}">
-                <a16:creationId xmlns:a16="http://schemas.microsoft.com/office/drawing/2014/main" id="{F9E38CE4-2F62-8908-E3CF-E03585EE9F5D}"/>
+                <a16:creationId xmlns:a16="http://schemas.microsoft.com/office/drawing/2014/main" id="{8C8EA536-C579-D077-D3FF-50C36C6662BA}"/>
               </a:ext>
             </a:extLst>
           </p:cNvPr>
@@ -24193,10 +22361,171 @@
           </a:p>
         </p:txBody>
       </p:sp>
+      <p:sp>
+        <p:nvSpPr>
+          <p:cNvPr id="5" name="Tekstvak 4">
+            <a:extLst>
+              <a:ext uri="{FF2B5EF4-FFF2-40B4-BE49-F238E27FC236}">
+                <a16:creationId xmlns:a16="http://schemas.microsoft.com/office/drawing/2014/main" id="{ED547CA0-D215-CE80-C9FE-83A4C337E39F}"/>
+              </a:ext>
+            </a:extLst>
+          </p:cNvPr>
+          <p:cNvSpPr txBox="1"/>
+          <p:nvPr/>
+        </p:nvSpPr>
+        <p:spPr>
+          <a:xfrm>
+            <a:off x="3502452" y="3626429"/>
+            <a:ext cx="1343025" cy="369332"/>
+          </a:xfrm>
+          <a:prstGeom prst="rect">
+            <a:avLst/>
+          </a:prstGeom>
+          <a:noFill/>
+        </p:spPr>
+        <p:txBody>
+          <a:bodyPr wrap="square" rtlCol="0">
+            <a:spAutoFit/>
+          </a:bodyPr>
+          <a:lstStyle/>
+          <a:p>
+            <a:pPr algn="ctr"/>
+            <a:r>
+              <a:rPr lang="nl-NL" dirty="0"/>
+              <a:t>Metaklasse</a:t>
+            </a:r>
+          </a:p>
+        </p:txBody>
+      </p:sp>
+      <p:sp>
+        <p:nvSpPr>
+          <p:cNvPr id="8" name="Tekstvak 7">
+            <a:extLst>
+              <a:ext uri="{FF2B5EF4-FFF2-40B4-BE49-F238E27FC236}">
+                <a16:creationId xmlns:a16="http://schemas.microsoft.com/office/drawing/2014/main" id="{438B3799-4BD5-37BD-B81D-C1BDD7B4B6F4}"/>
+              </a:ext>
+            </a:extLst>
+          </p:cNvPr>
+          <p:cNvSpPr txBox="1"/>
+          <p:nvPr/>
+        </p:nvSpPr>
+        <p:spPr>
+          <a:xfrm>
+            <a:off x="6753262" y="3626429"/>
+            <a:ext cx="1574411" cy="369332"/>
+          </a:xfrm>
+          <a:prstGeom prst="rect">
+            <a:avLst/>
+          </a:prstGeom>
+          <a:noFill/>
+        </p:spPr>
+        <p:txBody>
+          <a:bodyPr wrap="square" rtlCol="0">
+            <a:spAutoFit/>
+          </a:bodyPr>
+          <a:lstStyle/>
+          <a:p>
+            <a:pPr algn="ctr"/>
+            <a:r>
+              <a:rPr lang="nl-NL" dirty="0"/>
+              <a:t>Metagegeven</a:t>
+            </a:r>
+          </a:p>
+        </p:txBody>
+      </p:sp>
+      <p:cxnSp>
+        <p:nvCxnSpPr>
+          <p:cNvPr id="10" name="Rechte verbindingslijn met pijl 9">
+            <a:extLst>
+              <a:ext uri="{FF2B5EF4-FFF2-40B4-BE49-F238E27FC236}">
+                <a16:creationId xmlns:a16="http://schemas.microsoft.com/office/drawing/2014/main" id="{889CEADC-5D1C-27DD-438A-4C03E2D14B12}"/>
+              </a:ext>
+            </a:extLst>
+          </p:cNvPr>
+          <p:cNvCxnSpPr>
+            <a:cxnSpLocks/>
+            <a:stCxn id="6" idx="3"/>
+            <a:endCxn id="7" idx="1"/>
+          </p:cNvCxnSpPr>
+          <p:nvPr/>
+        </p:nvCxnSpPr>
+        <p:spPr>
+          <a:xfrm>
+            <a:off x="5002101" y="3834442"/>
+            <a:ext cx="1593012" cy="0"/>
+          </a:xfrm>
+          <a:prstGeom prst="straightConnector1">
+            <a:avLst/>
+          </a:prstGeom>
+          <a:ln w="31750">
+            <a:tailEnd type="arrow"/>
+          </a:ln>
+        </p:spPr>
+        <p:style>
+          <a:lnRef idx="1">
+            <a:schemeClr val="accent1"/>
+          </a:lnRef>
+          <a:fillRef idx="0">
+            <a:schemeClr val="accent1"/>
+          </a:fillRef>
+          <a:effectRef idx="0">
+            <a:schemeClr val="accent1"/>
+          </a:effectRef>
+          <a:fontRef idx="minor">
+            <a:schemeClr val="tx1"/>
+          </a:fontRef>
+        </p:style>
+      </p:cxnSp>
+      <p:cxnSp>
+        <p:nvCxnSpPr>
+          <p:cNvPr id="14" name="Verbindingslijn: gebogen 13">
+            <a:extLst>
+              <a:ext uri="{FF2B5EF4-FFF2-40B4-BE49-F238E27FC236}">
+                <a16:creationId xmlns:a16="http://schemas.microsoft.com/office/drawing/2014/main" id="{ED81D40E-D121-ED05-F575-541B704DD6B7}"/>
+              </a:ext>
+            </a:extLst>
+          </p:cNvPr>
+          <p:cNvCxnSpPr>
+            <a:stCxn id="6" idx="0"/>
+            <a:endCxn id="6" idx="1"/>
+          </p:cNvCxnSpPr>
+          <p:nvPr/>
+        </p:nvCxnSpPr>
+        <p:spPr>
+          <a:xfrm rot="16200000" flipH="1" flipV="1">
+            <a:off x="3557177" y="3217653"/>
+            <a:ext cx="405442" cy="828136"/>
+          </a:xfrm>
+          <a:prstGeom prst="bentConnector4">
+            <a:avLst>
+              <a:gd name="adj1" fmla="val -115957"/>
+              <a:gd name="adj2" fmla="val 165104"/>
+            </a:avLst>
+          </a:prstGeom>
+          <a:ln w="28575">
+            <a:headEnd w="lg" len="lg"/>
+            <a:tailEnd type="arrow"/>
+          </a:ln>
+        </p:spPr>
+        <p:style>
+          <a:lnRef idx="1">
+            <a:schemeClr val="accent1"/>
+          </a:lnRef>
+          <a:fillRef idx="0">
+            <a:schemeClr val="accent1"/>
+          </a:fillRef>
+          <a:effectRef idx="0">
+            <a:schemeClr val="accent1"/>
+          </a:effectRef>
+          <a:fontRef idx="minor">
+            <a:schemeClr val="tx1"/>
+          </a:fontRef>
+        </p:style>
+      </p:cxnSp>
     </p:spTree>
     <p:extLst>
       <p:ext uri="{BB962C8B-B14F-4D97-AF65-F5344CB8AC3E}">
-        <p14:creationId xmlns:p14="http://schemas.microsoft.com/office/powerpoint/2010/main" val="662030528"/>
+        <p14:creationId xmlns:p14="http://schemas.microsoft.com/office/powerpoint/2010/main" val="2538570804"/>
       </p:ext>
     </p:extLst>
   </p:cSld>
@@ -24733,17 +23062,6 @@
 </file>
 
 <file path=customXml/item1.xml><?xml version="1.0" encoding="utf-8"?>
-<p:properties xmlns:p="http://schemas.microsoft.com/office/2006/metadata/properties" xmlns:xsi="http://www.w3.org/2001/XMLSchema-instance" xmlns:pc="http://schemas.microsoft.com/office/infopath/2007/PartnerControls">
-  <documentManagement>
-    <TaxCatchAll xmlns="86b5f7f7-2f15-447a-b5f6-1e4312ec3a6d" xsi:nil="true"/>
-    <lcf76f155ced4ddcb4097134ff3c332f xmlns="385505e6-e5d7-4f1a-b335-045f4e6272b3">
-      <Terms xmlns="http://schemas.microsoft.com/office/infopath/2007/PartnerControls"/>
-    </lcf76f155ced4ddcb4097134ff3c332f>
-  </documentManagement>
-</p:properties>
-</file>
-
-<file path=customXml/item2.xml><?xml version="1.0" encoding="utf-8"?>
 <ct:contentTypeSchema xmlns:ct="http://schemas.microsoft.com/office/2006/metadata/contentType" xmlns:ma="http://schemas.microsoft.com/office/2006/metadata/properties/metaAttributes" ct:_="" ma:_="" ma:contentTypeName="Document" ma:contentTypeID="0x010100216A073BBB3FB3429D87D77C40313058" ma:contentTypeVersion="19" ma:contentTypeDescription="Een nieuw document maken." ma:contentTypeScope="" ma:versionID="9e249722b5e218343ac4fab273413c12">
   <xsd:schema xmlns:xsd="http://www.w3.org/2001/XMLSchema" xmlns:xs="http://www.w3.org/2001/XMLSchema" xmlns:p="http://schemas.microsoft.com/office/2006/metadata/properties" xmlns:ns2="385505e6-e5d7-4f1a-b335-045f4e6272b3" xmlns:ns3="86b5f7f7-2f15-447a-b5f6-1e4312ec3a6d" targetNamespace="http://schemas.microsoft.com/office/2006/metadata/properties" ma:root="true" ma:fieldsID="f0464eddd8f84469bcd94f36b09069a7" ns2:_="" ns3:_="">
     <xsd:import namespace="385505e6-e5d7-4f1a-b335-045f4e6272b3"/>
@@ -25004,6 +23322,17 @@
 </ct:contentTypeSchema>
 </file>
 
+<file path=customXml/item2.xml><?xml version="1.0" encoding="utf-8"?>
+<p:properties xmlns:p="http://schemas.microsoft.com/office/2006/metadata/properties" xmlns:xsi="http://www.w3.org/2001/XMLSchema-instance" xmlns:pc="http://schemas.microsoft.com/office/infopath/2007/PartnerControls">
+  <documentManagement>
+    <TaxCatchAll xmlns="86b5f7f7-2f15-447a-b5f6-1e4312ec3a6d" xsi:nil="true"/>
+    <lcf76f155ced4ddcb4097134ff3c332f xmlns="385505e6-e5d7-4f1a-b335-045f4e6272b3">
+      <Terms xmlns="http://schemas.microsoft.com/office/infopath/2007/PartnerControls"/>
+    </lcf76f155ced4ddcb4097134ff3c332f>
+  </documentManagement>
+</p:properties>
+</file>
+
 <file path=customXml/item3.xml><?xml version="1.0" encoding="utf-8"?>
 <?mso-contentType ?>
 <FormTemplates xmlns="http://schemas.microsoft.com/sharepoint/v3/contenttype/forms">
@@ -25014,23 +23343,6 @@
 </file>
 
 <file path=customXml/itemProps1.xml><?xml version="1.0" encoding="utf-8"?>
-<ds:datastoreItem xmlns:ds="http://schemas.openxmlformats.org/officeDocument/2006/customXml" ds:itemID="{87B8AD59-D75E-43C3-B552-374FFCAD4C0F}">
-  <ds:schemaRefs>
-    <ds:schemaRef ds:uri="http://schemas.microsoft.com/office/2006/metadata/properties"/>
-    <ds:schemaRef ds:uri="http://purl.org/dc/elements/1.1/"/>
-    <ds:schemaRef ds:uri="http://www.w3.org/XML/1998/namespace"/>
-    <ds:schemaRef ds:uri="http://schemas.openxmlformats.org/package/2006/metadata/core-properties"/>
-    <ds:schemaRef ds:uri="385505e6-e5d7-4f1a-b335-045f4e6272b3"/>
-    <ds:schemaRef ds:uri="http://schemas.microsoft.com/office/2006/documentManagement/types"/>
-    <ds:schemaRef ds:uri="http://purl.org/dc/terms/"/>
-    <ds:schemaRef ds:uri="http://schemas.microsoft.com/office/infopath/2007/PartnerControls"/>
-    <ds:schemaRef ds:uri="86b5f7f7-2f15-447a-b5f6-1e4312ec3a6d"/>
-    <ds:schemaRef ds:uri="http://purl.org/dc/dcmitype/"/>
-  </ds:schemaRefs>
-</ds:datastoreItem>
-</file>
-
-<file path=customXml/itemProps2.xml><?xml version="1.0" encoding="utf-8"?>
 <ds:datastoreItem xmlns:ds="http://schemas.openxmlformats.org/officeDocument/2006/customXml" ds:itemID="{B98FA32C-01B5-476F-827B-A9F707045CA6}">
   <ds:schemaRefs>
     <ds:schemaRef ds:uri="http://schemas.microsoft.com/office/2006/metadata/contentType"/>
@@ -25049,6 +23361,23 @@
 </ds:datastoreItem>
 </file>
 
+<file path=customXml/itemProps2.xml><?xml version="1.0" encoding="utf-8"?>
+<ds:datastoreItem xmlns:ds="http://schemas.openxmlformats.org/officeDocument/2006/customXml" ds:itemID="{87B8AD59-D75E-43C3-B552-374FFCAD4C0F}">
+  <ds:schemaRefs>
+    <ds:schemaRef ds:uri="http://schemas.microsoft.com/office/2006/metadata/properties"/>
+    <ds:schemaRef ds:uri="http://purl.org/dc/elements/1.1/"/>
+    <ds:schemaRef ds:uri="http://www.w3.org/XML/1998/namespace"/>
+    <ds:schemaRef ds:uri="http://schemas.openxmlformats.org/package/2006/metadata/core-properties"/>
+    <ds:schemaRef ds:uri="385505e6-e5d7-4f1a-b335-045f4e6272b3"/>
+    <ds:schemaRef ds:uri="http://schemas.microsoft.com/office/2006/documentManagement/types"/>
+    <ds:schemaRef ds:uri="http://purl.org/dc/terms/"/>
+    <ds:schemaRef ds:uri="http://schemas.microsoft.com/office/infopath/2007/PartnerControls"/>
+    <ds:schemaRef ds:uri="86b5f7f7-2f15-447a-b5f6-1e4312ec3a6d"/>
+    <ds:schemaRef ds:uri="http://purl.org/dc/dcmitype/"/>
+  </ds:schemaRefs>
+</ds:datastoreItem>
+</file>
+
 <file path=customXml/itemProps3.xml><?xml version="1.0" encoding="utf-8"?>
 <ds:datastoreItem xmlns:ds="http://schemas.openxmlformats.org/officeDocument/2006/customXml" ds:itemID="{D3B85B07-3498-4351-9BBF-A5D797D93861}">
   <ds:schemaRefs>

</xml_diff>